<commit_message>
Updated Exp. Group B Wiring Diagram
Clarified elements that are still being planned and added intermediate steps between the WRF simulations and GCAM-USA.
</commit_message>
<xml_diff>
--- a/experiment_diagrams/Experiment_B-N6_Interconnect/experiment-B-N6_interconnect.pptx
+++ b/experiment_diagrams/Experiment_B-N6_Interconnect/experiment-B-N6_interconnect.pptx
@@ -259,7 +259,7 @@
           <a:p>
             <a:fld id="{50E52EA3-2204-804F-9678-85900D481E2E}" type="datetimeFigureOut">
               <a:rPr lang="en-US" smtClean="0"/>
-              <a:t>2/11/22</a:t>
+              <a:t>2/18/22</a:t>
             </a:fld>
             <a:endParaRPr lang="en-US"/>
           </a:p>
@@ -457,7 +457,7 @@
           <a:p>
             <a:fld id="{50E52EA3-2204-804F-9678-85900D481E2E}" type="datetimeFigureOut">
               <a:rPr lang="en-US" smtClean="0"/>
-              <a:t>2/11/22</a:t>
+              <a:t>2/18/22</a:t>
             </a:fld>
             <a:endParaRPr lang="en-US"/>
           </a:p>
@@ -665,7 +665,7 @@
           <a:p>
             <a:fld id="{50E52EA3-2204-804F-9678-85900D481E2E}" type="datetimeFigureOut">
               <a:rPr lang="en-US" smtClean="0"/>
-              <a:t>2/11/22</a:t>
+              <a:t>2/18/22</a:t>
             </a:fld>
             <a:endParaRPr lang="en-US"/>
           </a:p>
@@ -863,7 +863,7 @@
           <a:p>
             <a:fld id="{50E52EA3-2204-804F-9678-85900D481E2E}" type="datetimeFigureOut">
               <a:rPr lang="en-US" smtClean="0"/>
-              <a:t>2/11/22</a:t>
+              <a:t>2/18/22</a:t>
             </a:fld>
             <a:endParaRPr lang="en-US"/>
           </a:p>
@@ -1138,7 +1138,7 @@
           <a:p>
             <a:fld id="{50E52EA3-2204-804F-9678-85900D481E2E}" type="datetimeFigureOut">
               <a:rPr lang="en-US" smtClean="0"/>
-              <a:t>2/11/22</a:t>
+              <a:t>2/18/22</a:t>
             </a:fld>
             <a:endParaRPr lang="en-US"/>
           </a:p>
@@ -1403,7 +1403,7 @@
           <a:p>
             <a:fld id="{50E52EA3-2204-804F-9678-85900D481E2E}" type="datetimeFigureOut">
               <a:rPr lang="en-US" smtClean="0"/>
-              <a:t>2/11/22</a:t>
+              <a:t>2/18/22</a:t>
             </a:fld>
             <a:endParaRPr lang="en-US"/>
           </a:p>
@@ -1815,7 +1815,7 @@
           <a:p>
             <a:fld id="{50E52EA3-2204-804F-9678-85900D481E2E}" type="datetimeFigureOut">
               <a:rPr lang="en-US" smtClean="0"/>
-              <a:t>2/11/22</a:t>
+              <a:t>2/18/22</a:t>
             </a:fld>
             <a:endParaRPr lang="en-US"/>
           </a:p>
@@ -1956,7 +1956,7 @@
           <a:p>
             <a:fld id="{50E52EA3-2204-804F-9678-85900D481E2E}" type="datetimeFigureOut">
               <a:rPr lang="en-US" smtClean="0"/>
-              <a:t>2/11/22</a:t>
+              <a:t>2/18/22</a:t>
             </a:fld>
             <a:endParaRPr lang="en-US"/>
           </a:p>
@@ -2069,7 +2069,7 @@
           <a:p>
             <a:fld id="{50E52EA3-2204-804F-9678-85900D481E2E}" type="datetimeFigureOut">
               <a:rPr lang="en-US" smtClean="0"/>
-              <a:t>2/11/22</a:t>
+              <a:t>2/18/22</a:t>
             </a:fld>
             <a:endParaRPr lang="en-US"/>
           </a:p>
@@ -2380,7 +2380,7 @@
           <a:p>
             <a:fld id="{50E52EA3-2204-804F-9678-85900D481E2E}" type="datetimeFigureOut">
               <a:rPr lang="en-US" smtClean="0"/>
-              <a:t>2/11/22</a:t>
+              <a:t>2/18/22</a:t>
             </a:fld>
             <a:endParaRPr lang="en-US"/>
           </a:p>
@@ -2668,7 +2668,7 @@
           <a:p>
             <a:fld id="{50E52EA3-2204-804F-9678-85900D481E2E}" type="datetimeFigureOut">
               <a:rPr lang="en-US" smtClean="0"/>
-              <a:t>2/11/22</a:t>
+              <a:t>2/18/22</a:t>
             </a:fld>
             <a:endParaRPr lang="en-US"/>
           </a:p>
@@ -2909,7 +2909,7 @@
           <a:p>
             <a:fld id="{50E52EA3-2204-804F-9678-85900D481E2E}" type="datetimeFigureOut">
               <a:rPr lang="en-US" smtClean="0"/>
-              <a:t>2/11/22</a:t>
+              <a:t>2/18/22</a:t>
             </a:fld>
             <a:endParaRPr lang="en-US"/>
           </a:p>
@@ -4425,7 +4425,7 @@
           </a:xfrm>
           <a:prstGeom prst="bentConnector4">
             <a:avLst>
-              <a:gd name="adj1" fmla="val -6646"/>
+              <a:gd name="adj1" fmla="val -2174"/>
               <a:gd name="adj2" fmla="val 103109"/>
             </a:avLst>
           </a:prstGeom>
@@ -4526,8 +4526,8 @@
         </p:nvSpPr>
         <p:spPr>
           <a:xfrm>
-            <a:off x="5054572" y="5872587"/>
-            <a:ext cx="2141756" cy="261610"/>
+            <a:off x="5286290" y="5779176"/>
+            <a:ext cx="1688175" cy="430887"/>
           </a:xfrm>
           <a:prstGeom prst="rect">
             <a:avLst/>
@@ -4556,7 +4556,27 @@
                 <a:cs typeface="Arial"/>
                 <a:sym typeface="Arial"/>
               </a:rPr>
-              <a:t>Annual (States/Major Basins)</a:t>
+              <a:t>Annual </a:t>
+            </a:r>
+          </a:p>
+          <a:p>
+            <a:pPr algn="ctr">
+              <a:buClr>
+                <a:srgbClr val="000000"/>
+              </a:buClr>
+              <a:buFont typeface="Arial"/>
+              <a:buNone/>
+            </a:pPr>
+            <a:r>
+              <a:rPr lang="en-US" sz="1100" b="1" kern="0" dirty="0">
+                <a:solidFill>
+                  <a:srgbClr val="7030A0"/>
+                </a:solidFill>
+                <a:latin typeface="Arial"/>
+                <a:cs typeface="Arial"/>
+                <a:sym typeface="Arial"/>
+              </a:rPr>
+              <a:t>(States/Major Basins)</a:t>
             </a:r>
           </a:p>
         </p:txBody>
@@ -4873,7 +4893,7 @@
             <a:solidFill>
               <a:srgbClr val="00B050"/>
             </a:solidFill>
-            <a:prstDash val="solid"/>
+            <a:prstDash val="sysDot"/>
             <a:miter lim="800000"/>
             <a:tailEnd type="triangle" w="lg" len="lg"/>
           </a:ln>
@@ -5083,7 +5103,7 @@
             <a:solidFill>
               <a:srgbClr val="00B050"/>
             </a:solidFill>
-            <a:prstDash val="dash"/>
+            <a:prstDash val="sysDot"/>
             <a:miter lim="800000"/>
             <a:tailEnd type="triangle" w="lg" len="lg"/>
           </a:ln>
@@ -5226,7 +5246,7 @@
             <a:solidFill>
               <a:srgbClr val="00B050"/>
             </a:solidFill>
-            <a:prstDash val="dash"/>
+            <a:prstDash val="sysDot"/>
             <a:miter lim="800000"/>
             <a:headEnd type="triangle" w="lg" len="lg"/>
             <a:tailEnd type="none" w="lg" len="lg"/>
@@ -5352,7 +5372,7 @@
         </p:nvGrpSpPr>
         <p:grpSpPr>
           <a:xfrm>
-            <a:off x="78054" y="5465440"/>
+            <a:off x="69539" y="5473928"/>
             <a:ext cx="1260281" cy="277335"/>
             <a:chOff x="257134" y="3606801"/>
             <a:chExt cx="1260281" cy="277335"/>
@@ -5632,7 +5652,7 @@
         </p:nvSpPr>
         <p:spPr>
           <a:xfrm>
-            <a:off x="10212457" y="5445762"/>
+            <a:off x="10161181" y="5462854"/>
             <a:ext cx="1688175" cy="738664"/>
           </a:xfrm>
           <a:prstGeom prst="rect">
@@ -5667,7 +5687,7 @@
         </p:nvSpPr>
         <p:spPr>
           <a:xfrm>
-            <a:off x="6816462" y="5437305"/>
+            <a:off x="6816462" y="5445851"/>
             <a:ext cx="1902690" cy="523220"/>
           </a:xfrm>
           <a:prstGeom prst="rect">
@@ -5739,7 +5759,7 @@
         </p:nvSpPr>
         <p:spPr>
           <a:xfrm>
-            <a:off x="4588495" y="2709847"/>
+            <a:off x="4587929" y="3669373"/>
             <a:ext cx="1160360" cy="1169551"/>
           </a:xfrm>
           <a:prstGeom prst="rect">
@@ -5775,7 +5795,7 @@
         </p:nvSpPr>
         <p:spPr>
           <a:xfrm>
-            <a:off x="5179452" y="558918"/>
+            <a:off x="5401646" y="738382"/>
             <a:ext cx="6051126" cy="307777"/>
           </a:xfrm>
           <a:prstGeom prst="rect">
@@ -5791,7 +5811,7 @@
           <a:p>
             <a:r>
               <a:rPr lang="en-US" sz="1400" dirty="0"/>
-              <a:t>Hourly weather variables as needed to derate thermoelectric power plants in GO </a:t>
+              <a:t>Hourly weather variables needed to derate thermoelectric power plants</a:t>
             </a:r>
           </a:p>
         </p:txBody>
@@ -5868,7 +5888,7 @@
             <a:solidFill>
               <a:srgbClr val="00B050"/>
             </a:solidFill>
-            <a:prstDash val="dash"/>
+            <a:prstDash val="sysDot"/>
             <a:miter lim="800000"/>
             <a:headEnd type="triangle" w="lg" len="lg"/>
             <a:tailEnd type="none" w="lg" len="lg"/>
@@ -5890,7 +5910,7 @@
         </p:nvSpPr>
         <p:spPr>
           <a:xfrm>
-            <a:off x="9992972" y="2990007"/>
+            <a:off x="9984426" y="2998553"/>
             <a:ext cx="959687" cy="738664"/>
           </a:xfrm>
           <a:prstGeom prst="rect">
@@ -5926,8 +5946,8 @@
         </p:nvSpPr>
         <p:spPr>
           <a:xfrm>
-            <a:off x="8876262" y="2025005"/>
-            <a:ext cx="651139" cy="261610"/>
+            <a:off x="8832229" y="1851352"/>
+            <a:ext cx="739205" cy="430887"/>
           </a:xfrm>
           <a:prstGeom prst="rect">
             <a:avLst/>
@@ -5935,7 +5955,7 @@
           <a:noFill/>
         </p:spPr>
         <p:txBody>
-          <a:bodyPr wrap="none" rtlCol="0">
+          <a:bodyPr wrap="square" rtlCol="0">
             <a:spAutoFit/>
           </a:bodyPr>
           <a:lstStyle/>
@@ -5956,7 +5976,7 @@
                 <a:cs typeface="Arial"/>
                 <a:sym typeface="Arial"/>
               </a:rPr>
-              <a:t>(1 km</a:t>
+              <a:t>CONUS (1 km</a:t>
             </a:r>
             <a:r>
               <a:rPr lang="en-US" sz="1100" b="1" kern="0" baseline="30000" dirty="0">
@@ -6113,13 +6133,14 @@
           <p:cNvCxnSpPr>
             <a:cxnSpLocks/>
             <a:stCxn id="70" idx="3"/>
+            <a:endCxn id="76" idx="0"/>
           </p:cNvCxnSpPr>
           <p:nvPr/>
         </p:nvCxnSpPr>
         <p:spPr>
           <a:xfrm>
             <a:off x="4963400" y="1214999"/>
-            <a:ext cx="771441" cy="3874472"/>
+            <a:ext cx="794428" cy="454353"/>
           </a:xfrm>
           <a:prstGeom prst="bentConnector2">
             <a:avLst/>
@@ -6129,7 +6150,7 @@
             <a:solidFill>
               <a:srgbClr val="00B050"/>
             </a:solidFill>
-            <a:prstDash val="solid"/>
+            <a:prstDash val="dash"/>
             <a:miter lim="800000"/>
             <a:tailEnd type="triangle" w="lg" len="lg"/>
           </a:ln>
@@ -6188,7 +6209,7 @@
         </p:nvSpPr>
         <p:spPr>
           <a:xfrm>
-            <a:off x="3448350" y="5678325"/>
+            <a:off x="3448350" y="5729601"/>
             <a:ext cx="848553" cy="738664"/>
           </a:xfrm>
           <a:prstGeom prst="rect">
@@ -6638,6 +6659,305 @@
           </a:p>
         </p:txBody>
       </p:sp>
+      <p:sp>
+        <p:nvSpPr>
+          <p:cNvPr id="76" name="Rounded Rectangle 75">
+            <a:extLst>
+              <a:ext uri="{FF2B5EF4-FFF2-40B4-BE49-F238E27FC236}">
+                <a16:creationId xmlns:a16="http://schemas.microsoft.com/office/drawing/2014/main" id="{A5AEB2BB-4E50-5D4C-A78A-F7021C22F135}"/>
+              </a:ext>
+            </a:extLst>
+          </p:cNvPr>
+          <p:cNvSpPr/>
+          <p:nvPr/>
+        </p:nvSpPr>
+        <p:spPr>
+          <a:xfrm>
+            <a:off x="5026308" y="1669352"/>
+            <a:ext cx="1463040" cy="744200"/>
+          </a:xfrm>
+          <a:prstGeom prst="roundRect">
+            <a:avLst/>
+          </a:prstGeom>
+          <a:solidFill>
+            <a:srgbClr val="FFFFFF">
+              <a:lumMod val="50000"/>
+            </a:srgbClr>
+          </a:solidFill>
+          <a:ln w="12700" cap="flat" cmpd="sng" algn="ctr">
+            <a:noFill/>
+            <a:prstDash val="solid"/>
+            <a:miter lim="800000"/>
+          </a:ln>
+          <a:effectLst/>
+        </p:spPr>
+        <p:txBody>
+          <a:bodyPr rtlCol="0" anchor="ctr"/>
+          <a:lstStyle/>
+          <a:p>
+            <a:pPr marL="0" marR="0" lvl="0" indent="0" algn="ctr" defTabSz="914400" eaLnBrk="1" fontAlgn="auto" latinLnBrk="0" hangingPunct="1">
+              <a:lnSpc>
+                <a:spcPct val="100000"/>
+              </a:lnSpc>
+              <a:spcBef>
+                <a:spcPts val="0"/>
+              </a:spcBef>
+              <a:spcAft>
+                <a:spcPts val="0"/>
+              </a:spcAft>
+              <a:buClr>
+                <a:srgbClr val="000000"/>
+              </a:buClr>
+              <a:buSzTx/>
+              <a:buFont typeface="Arial"/>
+              <a:buNone/>
+              <a:tabLst/>
+              <a:defRPr/>
+            </a:pPr>
+            <a:r>
+              <a:rPr kumimoji="0" lang="en-US" sz="1400" b="0" i="0" u="none" strike="noStrike" kern="0" cap="none" spc="0" normalizeH="0" baseline="0" noProof="0" dirty="0">
+                <a:ln>
+                  <a:noFill/>
+                </a:ln>
+                <a:solidFill>
+                  <a:srgbClr val="FFFFFF"/>
+                </a:solidFill>
+                <a:effectLst/>
+                <a:uLnTx/>
+                <a:uFillTx/>
+                <a:latin typeface="Calibri" panose="020F0502020204030204"/>
+                <a:ea typeface="+mn-ea"/>
+                <a:cs typeface="+mn-cs"/>
+                <a:sym typeface="Arial"/>
+              </a:rPr>
+              <a:t>Water Runoff Emulator</a:t>
+            </a:r>
+          </a:p>
+          <a:p>
+            <a:pPr marL="0" marR="0" lvl="0" indent="0" algn="ctr" defTabSz="914400" eaLnBrk="1" fontAlgn="auto" latinLnBrk="0" hangingPunct="1">
+              <a:lnSpc>
+                <a:spcPct val="100000"/>
+              </a:lnSpc>
+              <a:spcBef>
+                <a:spcPts val="0"/>
+              </a:spcBef>
+              <a:spcAft>
+                <a:spcPts val="0"/>
+              </a:spcAft>
+              <a:buClr>
+                <a:srgbClr val="000000"/>
+              </a:buClr>
+              <a:buSzTx/>
+              <a:buFont typeface="Arial"/>
+              <a:buNone/>
+              <a:tabLst/>
+              <a:defRPr/>
+            </a:pPr>
+            <a:r>
+              <a:rPr kumimoji="0" lang="en-US" sz="1400" b="0" i="0" u="none" strike="noStrike" kern="0" cap="none" spc="0" normalizeH="0" baseline="0" noProof="0" dirty="0">
+                <a:ln>
+                  <a:noFill/>
+                </a:ln>
+                <a:solidFill>
+                  <a:srgbClr val="FFFFFF"/>
+                </a:solidFill>
+                <a:effectLst/>
+                <a:uLnTx/>
+                <a:uFillTx/>
+                <a:latin typeface="Calibri" panose="020F0502020204030204"/>
+                <a:ea typeface="+mn-ea"/>
+                <a:cs typeface="+mn-cs"/>
+                <a:sym typeface="Arial"/>
+              </a:rPr>
+              <a:t>(Xanthos)</a:t>
+            </a:r>
+          </a:p>
+        </p:txBody>
+      </p:sp>
+      <p:sp>
+        <p:nvSpPr>
+          <p:cNvPr id="77" name="Rounded Rectangle 76">
+            <a:extLst>
+              <a:ext uri="{FF2B5EF4-FFF2-40B4-BE49-F238E27FC236}">
+                <a16:creationId xmlns:a16="http://schemas.microsoft.com/office/drawing/2014/main" id="{9AB0B74A-828D-9548-B981-A52F96E3244E}"/>
+              </a:ext>
+            </a:extLst>
+          </p:cNvPr>
+          <p:cNvSpPr/>
+          <p:nvPr/>
+        </p:nvSpPr>
+        <p:spPr>
+          <a:xfrm>
+            <a:off x="5026308" y="2813355"/>
+            <a:ext cx="1463040" cy="744200"/>
+          </a:xfrm>
+          <a:prstGeom prst="roundRect">
+            <a:avLst/>
+          </a:prstGeom>
+          <a:solidFill>
+            <a:srgbClr val="00B050"/>
+          </a:solidFill>
+          <a:ln w="12700" cap="flat" cmpd="sng" algn="ctr">
+            <a:noFill/>
+            <a:prstDash val="solid"/>
+            <a:miter lim="800000"/>
+          </a:ln>
+          <a:effectLst/>
+        </p:spPr>
+        <p:txBody>
+          <a:bodyPr rtlCol="0" anchor="ctr"/>
+          <a:lstStyle/>
+          <a:p>
+            <a:pPr marL="0" marR="0" lvl="0" indent="0" algn="ctr" defTabSz="914400" eaLnBrk="1" fontAlgn="auto" latinLnBrk="0" hangingPunct="1">
+              <a:lnSpc>
+                <a:spcPct val="100000"/>
+              </a:lnSpc>
+              <a:spcBef>
+                <a:spcPts val="0"/>
+              </a:spcBef>
+              <a:spcAft>
+                <a:spcPts val="0"/>
+              </a:spcAft>
+              <a:buClr>
+                <a:srgbClr val="000000"/>
+              </a:buClr>
+              <a:buSzTx/>
+              <a:buFont typeface="Arial"/>
+              <a:buNone/>
+              <a:tabLst/>
+              <a:defRPr/>
+            </a:pPr>
+            <a:r>
+              <a:rPr kumimoji="0" lang="en-US" sz="1400" b="0" i="0" u="none" strike="noStrike" kern="0" cap="none" spc="0" normalizeH="0" baseline="0" noProof="0" dirty="0">
+                <a:ln>
+                  <a:noFill/>
+                </a:ln>
+                <a:solidFill>
+                  <a:srgbClr val="FFFFFF"/>
+                </a:solidFill>
+                <a:effectLst/>
+                <a:uLnTx/>
+                <a:uFillTx/>
+                <a:latin typeface="Calibri" panose="020F0502020204030204"/>
+                <a:ea typeface="+mn-ea"/>
+                <a:cs typeface="+mn-cs"/>
+                <a:sym typeface="Arial"/>
+              </a:rPr>
+              <a:t>Heating/Cooling Degree Days</a:t>
+            </a:r>
+          </a:p>
+          <a:p>
+            <a:pPr marL="0" marR="0" lvl="0" indent="0" algn="ctr" defTabSz="914400" eaLnBrk="1" fontAlgn="auto" latinLnBrk="0" hangingPunct="1">
+              <a:lnSpc>
+                <a:spcPct val="100000"/>
+              </a:lnSpc>
+              <a:spcBef>
+                <a:spcPts val="0"/>
+              </a:spcBef>
+              <a:spcAft>
+                <a:spcPts val="0"/>
+              </a:spcAft>
+              <a:buClr>
+                <a:srgbClr val="000000"/>
+              </a:buClr>
+              <a:buSzTx/>
+              <a:buFont typeface="Arial"/>
+              <a:buNone/>
+              <a:tabLst/>
+              <a:defRPr/>
+            </a:pPr>
+            <a:r>
+              <a:rPr kumimoji="0" lang="en-US" sz="1400" b="0" i="0" u="none" strike="noStrike" kern="0" cap="none" spc="0" normalizeH="0" baseline="0" noProof="0" dirty="0">
+                <a:ln>
+                  <a:noFill/>
+                </a:ln>
+                <a:solidFill>
+                  <a:srgbClr val="FFFFFF"/>
+                </a:solidFill>
+                <a:effectLst/>
+                <a:uLnTx/>
+                <a:uFillTx/>
+                <a:latin typeface="Calibri" panose="020F0502020204030204"/>
+                <a:ea typeface="+mn-ea"/>
+                <a:cs typeface="+mn-cs"/>
+                <a:sym typeface="Arial"/>
+              </a:rPr>
+              <a:t>(Helios)</a:t>
+            </a:r>
+          </a:p>
+        </p:txBody>
+      </p:sp>
+      <p:cxnSp>
+        <p:nvCxnSpPr>
+          <p:cNvPr id="80" name="Straight Arrow Connector 79">
+            <a:extLst>
+              <a:ext uri="{FF2B5EF4-FFF2-40B4-BE49-F238E27FC236}">
+                <a16:creationId xmlns:a16="http://schemas.microsoft.com/office/drawing/2014/main" id="{BEA5E7F8-407A-344D-8F97-6D535B899065}"/>
+              </a:ext>
+            </a:extLst>
+          </p:cNvPr>
+          <p:cNvCxnSpPr>
+            <a:cxnSpLocks/>
+            <a:stCxn id="76" idx="2"/>
+            <a:endCxn id="77" idx="0"/>
+          </p:cNvCxnSpPr>
+          <p:nvPr/>
+        </p:nvCxnSpPr>
+        <p:spPr>
+          <a:xfrm>
+            <a:off x="5757828" y="2413552"/>
+            <a:ext cx="0" cy="399803"/>
+          </a:xfrm>
+          <a:prstGeom prst="straightConnector1">
+            <a:avLst/>
+          </a:prstGeom>
+          <a:noFill/>
+          <a:ln w="28575" cap="flat" cmpd="sng" algn="ctr">
+            <a:solidFill>
+              <a:srgbClr val="00B050"/>
+            </a:solidFill>
+            <a:prstDash val="dash"/>
+            <a:miter lim="800000"/>
+            <a:tailEnd type="triangle" w="lg" len="lg"/>
+          </a:ln>
+          <a:effectLst/>
+        </p:spPr>
+      </p:cxnSp>
+      <p:cxnSp>
+        <p:nvCxnSpPr>
+          <p:cNvPr id="81" name="Straight Arrow Connector 80">
+            <a:extLst>
+              <a:ext uri="{FF2B5EF4-FFF2-40B4-BE49-F238E27FC236}">
+                <a16:creationId xmlns:a16="http://schemas.microsoft.com/office/drawing/2014/main" id="{CEE1025D-359D-AC41-BDC4-C109A6A6C0D0}"/>
+              </a:ext>
+            </a:extLst>
+          </p:cNvPr>
+          <p:cNvCxnSpPr>
+            <a:cxnSpLocks/>
+            <a:stCxn id="77" idx="2"/>
+          </p:cNvCxnSpPr>
+          <p:nvPr/>
+        </p:nvCxnSpPr>
+        <p:spPr>
+          <a:xfrm>
+            <a:off x="5757828" y="3557555"/>
+            <a:ext cx="664" cy="1515415"/>
+          </a:xfrm>
+          <a:prstGeom prst="straightConnector1">
+            <a:avLst/>
+          </a:prstGeom>
+          <a:noFill/>
+          <a:ln w="28575" cap="flat" cmpd="sng" algn="ctr">
+            <a:solidFill>
+              <a:srgbClr val="00B050"/>
+            </a:solidFill>
+            <a:prstDash val="dash"/>
+            <a:miter lim="800000"/>
+            <a:tailEnd type="triangle" w="lg" len="lg"/>
+          </a:ln>
+          <a:effectLst/>
+        </p:spPr>
+      </p:cxnSp>
     </p:spTree>
     <p:extLst>
       <p:ext uri="{BB962C8B-B14F-4D97-AF65-F5344CB8AC3E}">

</xml_diff>

<commit_message>
Updated Exp. Group B diagram
</commit_message>
<xml_diff>
--- a/experiment_diagrams/Experiment_B-N6_Interconnect/experiment-B-N6_interconnect.pptx
+++ b/experiment_diagrams/Experiment_B-N6_Interconnect/experiment-B-N6_interconnect.pptx
@@ -112,6 +112,563 @@
 </p:presentation>
 </file>
 
+<file path=ppt/revisionInfo.xml><?xml version="1.0" encoding="utf-8"?>
+<p1510:revInfo xmlns:a="http://schemas.openxmlformats.org/drawingml/2006/main" xmlns:r="http://schemas.openxmlformats.org/officeDocument/2006/relationships" xmlns:p1510="http://schemas.microsoft.com/office/powerpoint/2015/10/main">
+  <p1510:revLst>
+    <p1510:client id="{42F185BA-E944-7349-BD1D-9F7EEEFEAF9E}" v="15" dt="2022-03-05T01:03:30.360"/>
+  </p1510:revLst>
+</p1510:revInfo>
+</file>
+
+<file path=ppt/changesInfos/changesInfo1.xml><?xml version="1.0" encoding="utf-8"?>
+<pc:chgInfo xmlns:a="http://schemas.openxmlformats.org/drawingml/2006/main" xmlns:r="http://schemas.openxmlformats.org/officeDocument/2006/relationships" xmlns:ac="http://schemas.microsoft.com/office/drawing/2013/main/command" xmlns:pc="http://schemas.microsoft.com/office/powerpoint/2013/main/command">
+  <pc:docChgLst>
+    <pc:chgData name="Burleyson, Casey D" userId="b4ad0ccb-f19a-4f64-98e6-0a4e417b5212" providerId="ADAL" clId="{42F185BA-E944-7349-BD1D-9F7EEEFEAF9E}"/>
+    <pc:docChg chg="undo custSel modSld">
+      <pc:chgData name="Burleyson, Casey D" userId="b4ad0ccb-f19a-4f64-98e6-0a4e417b5212" providerId="ADAL" clId="{42F185BA-E944-7349-BD1D-9F7EEEFEAF9E}" dt="2022-03-05T01:04:58.243" v="570" actId="692"/>
+      <pc:docMkLst>
+        <pc:docMk/>
+      </pc:docMkLst>
+      <pc:sldChg chg="addSp delSp modSp mod">
+        <pc:chgData name="Burleyson, Casey D" userId="b4ad0ccb-f19a-4f64-98e6-0a4e417b5212" providerId="ADAL" clId="{42F185BA-E944-7349-BD1D-9F7EEEFEAF9E}" dt="2022-03-05T01:04:58.243" v="570" actId="692"/>
+        <pc:sldMkLst>
+          <pc:docMk/>
+          <pc:sldMk cId="1723375323" sldId="257"/>
+        </pc:sldMkLst>
+        <pc:spChg chg="mod">
+          <ac:chgData name="Burleyson, Casey D" userId="b4ad0ccb-f19a-4f64-98e6-0a4e417b5212" providerId="ADAL" clId="{42F185BA-E944-7349-BD1D-9F7EEEFEAF9E}" dt="2022-03-05T01:03:14.982" v="522" actId="113"/>
+          <ac:spMkLst>
+            <pc:docMk/>
+            <pc:sldMk cId="1723375323" sldId="257"/>
+            <ac:spMk id="3" creationId="{472D95DD-DC61-D648-9992-BF218E98C908}"/>
+          </ac:spMkLst>
+        </pc:spChg>
+        <pc:spChg chg="mod">
+          <ac:chgData name="Burleyson, Casey D" userId="b4ad0ccb-f19a-4f64-98e6-0a4e417b5212" providerId="ADAL" clId="{42F185BA-E944-7349-BD1D-9F7EEEFEAF9E}" dt="2022-03-05T01:03:08.502" v="520" actId="113"/>
+          <ac:spMkLst>
+            <pc:docMk/>
+            <pc:sldMk cId="1723375323" sldId="257"/>
+            <ac:spMk id="4" creationId="{EE940FB5-27B2-CB44-B83F-B97BA5BFF786}"/>
+          </ac:spMkLst>
+        </pc:spChg>
+        <pc:spChg chg="mod">
+          <ac:chgData name="Burleyson, Casey D" userId="b4ad0ccb-f19a-4f64-98e6-0a4e417b5212" providerId="ADAL" clId="{42F185BA-E944-7349-BD1D-9F7EEEFEAF9E}" dt="2022-03-05T00:52:45.884" v="281" actId="692"/>
+          <ac:spMkLst>
+            <pc:docMk/>
+            <pc:sldMk cId="1723375323" sldId="257"/>
+            <ac:spMk id="12" creationId="{F0116956-FCCD-0748-BCB3-ABD6C0D6A895}"/>
+          </ac:spMkLst>
+        </pc:spChg>
+        <pc:spChg chg="mod">
+          <ac:chgData name="Burleyson, Casey D" userId="b4ad0ccb-f19a-4f64-98e6-0a4e417b5212" providerId="ADAL" clId="{42F185BA-E944-7349-BD1D-9F7EEEFEAF9E}" dt="2022-03-05T01:03:30.360" v="525" actId="164"/>
+          <ac:spMkLst>
+            <pc:docMk/>
+            <pc:sldMk cId="1723375323" sldId="257"/>
+            <ac:spMk id="13" creationId="{8F2808AF-5952-8843-AF70-52BA5B85ABA7}"/>
+          </ac:spMkLst>
+        </pc:spChg>
+        <pc:spChg chg="mod">
+          <ac:chgData name="Burleyson, Casey D" userId="b4ad0ccb-f19a-4f64-98e6-0a4e417b5212" providerId="ADAL" clId="{42F185BA-E944-7349-BD1D-9F7EEEFEAF9E}" dt="2022-03-05T00:55:05.522" v="317" actId="207"/>
+          <ac:spMkLst>
+            <pc:docMk/>
+            <pc:sldMk cId="1723375323" sldId="257"/>
+            <ac:spMk id="18" creationId="{CB3773D0-064F-C840-942F-AED3E66D04EE}"/>
+          </ac:spMkLst>
+        </pc:spChg>
+        <pc:spChg chg="mod">
+          <ac:chgData name="Burleyson, Casey D" userId="b4ad0ccb-f19a-4f64-98e6-0a4e417b5212" providerId="ADAL" clId="{42F185BA-E944-7349-BD1D-9F7EEEFEAF9E}" dt="2022-03-05T00:52:21.303" v="269" actId="692"/>
+          <ac:spMkLst>
+            <pc:docMk/>
+            <pc:sldMk cId="1723375323" sldId="257"/>
+            <ac:spMk id="24" creationId="{1D075DFC-86C8-F549-9F4F-5BAF7DAC4516}"/>
+          </ac:spMkLst>
+        </pc:spChg>
+        <pc:spChg chg="mod">
+          <ac:chgData name="Burleyson, Casey D" userId="b4ad0ccb-f19a-4f64-98e6-0a4e417b5212" providerId="ADAL" clId="{42F185BA-E944-7349-BD1D-9F7EEEFEAF9E}" dt="2022-03-05T01:03:30.360" v="525" actId="164"/>
+          <ac:spMkLst>
+            <pc:docMk/>
+            <pc:sldMk cId="1723375323" sldId="257"/>
+            <ac:spMk id="29" creationId="{F56FB104-9D0D-D245-80A2-BC882529750C}"/>
+          </ac:spMkLst>
+        </pc:spChg>
+        <pc:spChg chg="del">
+          <ac:chgData name="Burleyson, Casey D" userId="b4ad0ccb-f19a-4f64-98e6-0a4e417b5212" providerId="ADAL" clId="{42F185BA-E944-7349-BD1D-9F7EEEFEAF9E}" dt="2022-03-05T00:48:31.959" v="116" actId="478"/>
+          <ac:spMkLst>
+            <pc:docMk/>
+            <pc:sldMk cId="1723375323" sldId="257"/>
+            <ac:spMk id="30" creationId="{1B0B6E02-C7EB-6740-BB61-7222D35DD413}"/>
+          </ac:spMkLst>
+        </pc:spChg>
+        <pc:spChg chg="mod">
+          <ac:chgData name="Burleyson, Casey D" userId="b4ad0ccb-f19a-4f64-98e6-0a4e417b5212" providerId="ADAL" clId="{42F185BA-E944-7349-BD1D-9F7EEEFEAF9E}" dt="2022-03-05T01:03:30.360" v="525" actId="164"/>
+          <ac:spMkLst>
+            <pc:docMk/>
+            <pc:sldMk cId="1723375323" sldId="257"/>
+            <ac:spMk id="31" creationId="{64DE08EC-9A73-5D41-A228-A2A023250EB5}"/>
+          </ac:spMkLst>
+        </pc:spChg>
+        <pc:spChg chg="mod">
+          <ac:chgData name="Burleyson, Casey D" userId="b4ad0ccb-f19a-4f64-98e6-0a4e417b5212" providerId="ADAL" clId="{42F185BA-E944-7349-BD1D-9F7EEEFEAF9E}" dt="2022-03-05T01:03:30.360" v="525" actId="164"/>
+          <ac:spMkLst>
+            <pc:docMk/>
+            <pc:sldMk cId="1723375323" sldId="257"/>
+            <ac:spMk id="35" creationId="{E18794E3-E5B7-084B-B1CC-6DE7E21ED13B}"/>
+          </ac:spMkLst>
+        </pc:spChg>
+        <pc:spChg chg="mod">
+          <ac:chgData name="Burleyson, Casey D" userId="b4ad0ccb-f19a-4f64-98e6-0a4e417b5212" providerId="ADAL" clId="{42F185BA-E944-7349-BD1D-9F7EEEFEAF9E}" dt="2022-03-05T00:52:29.468" v="275" actId="692"/>
+          <ac:spMkLst>
+            <pc:docMk/>
+            <pc:sldMk cId="1723375323" sldId="257"/>
+            <ac:spMk id="36" creationId="{BC28141A-8220-3B48-9D85-19C7DBB3D748}"/>
+          </ac:spMkLst>
+        </pc:spChg>
+        <pc:spChg chg="del">
+          <ac:chgData name="Burleyson, Casey D" userId="b4ad0ccb-f19a-4f64-98e6-0a4e417b5212" providerId="ADAL" clId="{42F185BA-E944-7349-BD1D-9F7EEEFEAF9E}" dt="2022-03-05T00:48:27.357" v="113" actId="478"/>
+          <ac:spMkLst>
+            <pc:docMk/>
+            <pc:sldMk cId="1723375323" sldId="257"/>
+            <ac:spMk id="47" creationId="{162E347A-AFA7-FD4B-BE36-BD8D6AF07312}"/>
+          </ac:spMkLst>
+        </pc:spChg>
+        <pc:spChg chg="mod">
+          <ac:chgData name="Burleyson, Casey D" userId="b4ad0ccb-f19a-4f64-98e6-0a4e417b5212" providerId="ADAL" clId="{42F185BA-E944-7349-BD1D-9F7EEEFEAF9E}" dt="2022-03-05T01:04:20.170" v="563" actId="1035"/>
+          <ac:spMkLst>
+            <pc:docMk/>
+            <pc:sldMk cId="1723375323" sldId="257"/>
+            <ac:spMk id="53" creationId="{2707E22F-F80B-9048-B4E2-415E39D454A2}"/>
+          </ac:spMkLst>
+        </pc:spChg>
+        <pc:spChg chg="mod">
+          <ac:chgData name="Burleyson, Casey D" userId="b4ad0ccb-f19a-4f64-98e6-0a4e417b5212" providerId="ADAL" clId="{42F185BA-E944-7349-BD1D-9F7EEEFEAF9E}" dt="2022-03-05T00:51:50.129" v="254" actId="692"/>
+          <ac:spMkLst>
+            <pc:docMk/>
+            <pc:sldMk cId="1723375323" sldId="257"/>
+            <ac:spMk id="54" creationId="{2496E921-A9F4-D645-8C0F-4915E0C64BAC}"/>
+          </ac:spMkLst>
+        </pc:spChg>
+        <pc:spChg chg="mod">
+          <ac:chgData name="Burleyson, Casey D" userId="b4ad0ccb-f19a-4f64-98e6-0a4e417b5212" providerId="ADAL" clId="{42F185BA-E944-7349-BD1D-9F7EEEFEAF9E}" dt="2022-03-05T01:02:51.876" v="508" actId="113"/>
+          <ac:spMkLst>
+            <pc:docMk/>
+            <pc:sldMk cId="1723375323" sldId="257"/>
+            <ac:spMk id="59" creationId="{2E830D7D-98B2-5049-A700-3D0B7C0B1185}"/>
+          </ac:spMkLst>
+        </pc:spChg>
+        <pc:spChg chg="mod">
+          <ac:chgData name="Burleyson, Casey D" userId="b4ad0ccb-f19a-4f64-98e6-0a4e417b5212" providerId="ADAL" clId="{42F185BA-E944-7349-BD1D-9F7EEEFEAF9E}" dt="2022-03-05T01:02:49.535" v="507" actId="113"/>
+          <ac:spMkLst>
+            <pc:docMk/>
+            <pc:sldMk cId="1723375323" sldId="257"/>
+            <ac:spMk id="60" creationId="{95697975-EAFC-EF43-8DE3-97766A57C7AE}"/>
+          </ac:spMkLst>
+        </pc:spChg>
+        <pc:spChg chg="mod">
+          <ac:chgData name="Burleyson, Casey D" userId="b4ad0ccb-f19a-4f64-98e6-0a4e417b5212" providerId="ADAL" clId="{42F185BA-E944-7349-BD1D-9F7EEEFEAF9E}" dt="2022-03-05T01:03:17.784" v="523" actId="113"/>
+          <ac:spMkLst>
+            <pc:docMk/>
+            <pc:sldMk cId="1723375323" sldId="257"/>
+            <ac:spMk id="62" creationId="{BB5BDC1D-C801-824E-8697-6244FE33D14D}"/>
+          </ac:spMkLst>
+        </pc:spChg>
+        <pc:spChg chg="mod">
+          <ac:chgData name="Burleyson, Casey D" userId="b4ad0ccb-f19a-4f64-98e6-0a4e417b5212" providerId="ADAL" clId="{42F185BA-E944-7349-BD1D-9F7EEEFEAF9E}" dt="2022-03-05T01:02:54.338" v="509" actId="113"/>
+          <ac:spMkLst>
+            <pc:docMk/>
+            <pc:sldMk cId="1723375323" sldId="257"/>
+            <ac:spMk id="63" creationId="{47BD10D5-8F86-9441-A6C6-BADB16DB5D03}"/>
+          </ac:spMkLst>
+        </pc:spChg>
+        <pc:spChg chg="mod">
+          <ac:chgData name="Burleyson, Casey D" userId="b4ad0ccb-f19a-4f64-98e6-0a4e417b5212" providerId="ADAL" clId="{42F185BA-E944-7349-BD1D-9F7EEEFEAF9E}" dt="2022-03-05T01:03:11.438" v="521" actId="113"/>
+          <ac:spMkLst>
+            <pc:docMk/>
+            <pc:sldMk cId="1723375323" sldId="257"/>
+            <ac:spMk id="65" creationId="{A4BA03A6-DE29-AE4B-8989-AF09CDFD8120}"/>
+          </ac:spMkLst>
+        </pc:spChg>
+        <pc:spChg chg="mod">
+          <ac:chgData name="Burleyson, Casey D" userId="b4ad0ccb-f19a-4f64-98e6-0a4e417b5212" providerId="ADAL" clId="{42F185BA-E944-7349-BD1D-9F7EEEFEAF9E}" dt="2022-03-05T00:51:56.482" v="259" actId="692"/>
+          <ac:spMkLst>
+            <pc:docMk/>
+            <pc:sldMk cId="1723375323" sldId="257"/>
+            <ac:spMk id="70" creationId="{33144FA7-DB63-E44B-B5F6-03C886F88948}"/>
+          </ac:spMkLst>
+        </pc:spChg>
+        <pc:spChg chg="mod">
+          <ac:chgData name="Burleyson, Casey D" userId="b4ad0ccb-f19a-4f64-98e6-0a4e417b5212" providerId="ADAL" clId="{42F185BA-E944-7349-BD1D-9F7EEEFEAF9E}" dt="2022-03-05T00:52:52.724" v="287" actId="692"/>
+          <ac:spMkLst>
+            <pc:docMk/>
+            <pc:sldMk cId="1723375323" sldId="257"/>
+            <ac:spMk id="76" creationId="{A5AEB2BB-4E50-5D4C-A78A-F7021C22F135}"/>
+          </ac:spMkLst>
+        </pc:spChg>
+        <pc:spChg chg="mod">
+          <ac:chgData name="Burleyson, Casey D" userId="b4ad0ccb-f19a-4f64-98e6-0a4e417b5212" providerId="ADAL" clId="{42F185BA-E944-7349-BD1D-9F7EEEFEAF9E}" dt="2022-03-05T00:52:59.928" v="293" actId="692"/>
+          <ac:spMkLst>
+            <pc:docMk/>
+            <pc:sldMk cId="1723375323" sldId="257"/>
+            <ac:spMk id="77" creationId="{9AB0B74A-828D-9548-B981-A52F96E3244E}"/>
+          </ac:spMkLst>
+        </pc:spChg>
+        <pc:spChg chg="add mod">
+          <ac:chgData name="Burleyson, Casey D" userId="b4ad0ccb-f19a-4f64-98e6-0a4e417b5212" providerId="ADAL" clId="{42F185BA-E944-7349-BD1D-9F7EEEFEAF9E}" dt="2022-03-05T00:53:24.774" v="300" actId="1076"/>
+          <ac:spMkLst>
+            <pc:docMk/>
+            <pc:sldMk cId="1723375323" sldId="257"/>
+            <ac:spMk id="78" creationId="{2213A539-FE75-2E49-97A2-21078ECCB86B}"/>
+          </ac:spMkLst>
+        </pc:spChg>
+        <pc:spChg chg="add mod">
+          <ac:chgData name="Burleyson, Casey D" userId="b4ad0ccb-f19a-4f64-98e6-0a4e417b5212" providerId="ADAL" clId="{42F185BA-E944-7349-BD1D-9F7EEEFEAF9E}" dt="2022-03-05T01:00:42.462" v="441" actId="1076"/>
+          <ac:spMkLst>
+            <pc:docMk/>
+            <pc:sldMk cId="1723375323" sldId="257"/>
+            <ac:spMk id="87" creationId="{CA6C9072-E18D-5A47-B9D2-B883D90FF579}"/>
+          </ac:spMkLst>
+        </pc:spChg>
+        <pc:spChg chg="mod">
+          <ac:chgData name="Burleyson, Casey D" userId="b4ad0ccb-f19a-4f64-98e6-0a4e417b5212" providerId="ADAL" clId="{42F185BA-E944-7349-BD1D-9F7EEEFEAF9E}" dt="2022-03-05T01:02:42.113" v="505" actId="113"/>
+          <ac:spMkLst>
+            <pc:docMk/>
+            <pc:sldMk cId="1723375323" sldId="257"/>
+            <ac:spMk id="102" creationId="{1BE3D55E-57B2-404D-A2F9-0D3653D980EC}"/>
+          </ac:spMkLst>
+        </pc:spChg>
+        <pc:spChg chg="mod">
+          <ac:chgData name="Burleyson, Casey D" userId="b4ad0ccb-f19a-4f64-98e6-0a4e417b5212" providerId="ADAL" clId="{42F185BA-E944-7349-BD1D-9F7EEEFEAF9E}" dt="2022-03-05T01:02:45.417" v="506" actId="113"/>
+          <ac:spMkLst>
+            <pc:docMk/>
+            <pc:sldMk cId="1723375323" sldId="257"/>
+            <ac:spMk id="113" creationId="{37ACEC3B-5BD7-7045-8EA6-FA0BACD95F14}"/>
+          </ac:spMkLst>
+        </pc:spChg>
+        <pc:spChg chg="add mod">
+          <ac:chgData name="Burleyson, Casey D" userId="b4ad0ccb-f19a-4f64-98e6-0a4e417b5212" providerId="ADAL" clId="{42F185BA-E944-7349-BD1D-9F7EEEFEAF9E}" dt="2022-03-05T01:03:30.360" v="525" actId="164"/>
+          <ac:spMkLst>
+            <pc:docMk/>
+            <pc:sldMk cId="1723375323" sldId="257"/>
+            <ac:spMk id="118" creationId="{137691AA-0AEF-B34E-991D-DFE44F2A79A5}"/>
+          </ac:spMkLst>
+        </pc:spChg>
+        <pc:spChg chg="mod">
+          <ac:chgData name="Burleyson, Casey D" userId="b4ad0ccb-f19a-4f64-98e6-0a4e417b5212" providerId="ADAL" clId="{42F185BA-E944-7349-BD1D-9F7EEEFEAF9E}" dt="2022-03-05T00:48:28.170" v="114" actId="6549"/>
+          <ac:spMkLst>
+            <pc:docMk/>
+            <pc:sldMk cId="1723375323" sldId="257"/>
+            <ac:spMk id="162" creationId="{A35E0840-8235-B846-BD36-417BC1BD0790}"/>
+          </ac:spMkLst>
+        </pc:spChg>
+        <pc:spChg chg="mod topLvl">
+          <ac:chgData name="Burleyson, Casey D" userId="b4ad0ccb-f19a-4f64-98e6-0a4e417b5212" providerId="ADAL" clId="{42F185BA-E944-7349-BD1D-9F7EEEFEAF9E}" dt="2022-03-05T00:50:50.223" v="238" actId="338"/>
+          <ac:spMkLst>
+            <pc:docMk/>
+            <pc:sldMk cId="1723375323" sldId="257"/>
+            <ac:spMk id="203" creationId="{777C1B20-7A8B-3B43-9896-A5BEAC01CBA9}"/>
+          </ac:spMkLst>
+        </pc:spChg>
+        <pc:spChg chg="del">
+          <ac:chgData name="Burleyson, Casey D" userId="b4ad0ccb-f19a-4f64-98e6-0a4e417b5212" providerId="ADAL" clId="{42F185BA-E944-7349-BD1D-9F7EEEFEAF9E}" dt="2022-03-05T00:48:35.041" v="119" actId="478"/>
+          <ac:spMkLst>
+            <pc:docMk/>
+            <pc:sldMk cId="1723375323" sldId="257"/>
+            <ac:spMk id="206" creationId="{2649FDA2-4F8C-D945-B853-CF0E3754B8A7}"/>
+          </ac:spMkLst>
+        </pc:spChg>
+        <pc:grpChg chg="add mod">
+          <ac:chgData name="Burleyson, Casey D" userId="b4ad0ccb-f19a-4f64-98e6-0a4e417b5212" providerId="ADAL" clId="{42F185BA-E944-7349-BD1D-9F7EEEFEAF9E}" dt="2022-03-05T01:03:30.360" v="525" actId="164"/>
+          <ac:grpSpMkLst>
+            <pc:docMk/>
+            <pc:sldMk cId="1723375323" sldId="257"/>
+            <ac:grpSpMk id="7" creationId="{B6A06564-2248-3A4A-B71D-C12038F41874}"/>
+          </ac:grpSpMkLst>
+        </pc:grpChg>
+        <pc:grpChg chg="mod">
+          <ac:chgData name="Burleyson, Casey D" userId="b4ad0ccb-f19a-4f64-98e6-0a4e417b5212" providerId="ADAL" clId="{42F185BA-E944-7349-BD1D-9F7EEEFEAF9E}" dt="2022-03-05T01:03:30.360" v="525" actId="164"/>
+          <ac:grpSpMkLst>
+            <pc:docMk/>
+            <pc:sldMk cId="1723375323" sldId="257"/>
+            <ac:grpSpMk id="11" creationId="{9C52BBD8-1A23-014D-A601-48DA43FB3C4C}"/>
+          </ac:grpSpMkLst>
+        </pc:grpChg>
+        <pc:grpChg chg="add mod">
+          <ac:chgData name="Burleyson, Casey D" userId="b4ad0ccb-f19a-4f64-98e6-0a4e417b5212" providerId="ADAL" clId="{42F185BA-E944-7349-BD1D-9F7EEEFEAF9E}" dt="2022-03-05T01:03:33.538" v="542" actId="1038"/>
+          <ac:grpSpMkLst>
+            <pc:docMk/>
+            <pc:sldMk cId="1723375323" sldId="257"/>
+            <ac:grpSpMk id="103" creationId="{F49108ED-E2EC-A04F-B805-797F8A2E518B}"/>
+          </ac:grpSpMkLst>
+        </pc:grpChg>
+        <pc:grpChg chg="del">
+          <ac:chgData name="Burleyson, Casey D" userId="b4ad0ccb-f19a-4f64-98e6-0a4e417b5212" providerId="ADAL" clId="{42F185BA-E944-7349-BD1D-9F7EEEFEAF9E}" dt="2022-03-05T00:48:29.157" v="115" actId="478"/>
+          <ac:grpSpMkLst>
+            <pc:docMk/>
+            <pc:sldMk cId="1723375323" sldId="257"/>
+            <ac:grpSpMk id="188" creationId="{98F66DC2-D6E7-4447-96EA-82619906486A}"/>
+          </ac:grpSpMkLst>
+        </pc:grpChg>
+        <pc:grpChg chg="del mod">
+          <ac:chgData name="Burleyson, Casey D" userId="b4ad0ccb-f19a-4f64-98e6-0a4e417b5212" providerId="ADAL" clId="{42F185BA-E944-7349-BD1D-9F7EEEFEAF9E}" dt="2022-03-05T00:48:33.345" v="118" actId="478"/>
+          <ac:grpSpMkLst>
+            <pc:docMk/>
+            <pc:sldMk cId="1723375323" sldId="257"/>
+            <ac:grpSpMk id="200" creationId="{7CF0757D-627E-D242-B3A9-BB84457764A5}"/>
+          </ac:grpSpMkLst>
+        </pc:grpChg>
+        <pc:grpChg chg="del mod">
+          <ac:chgData name="Burleyson, Casey D" userId="b4ad0ccb-f19a-4f64-98e6-0a4e417b5212" providerId="ADAL" clId="{42F185BA-E944-7349-BD1D-9F7EEEFEAF9E}" dt="2022-03-05T00:49:58.681" v="210" actId="165"/>
+          <ac:grpSpMkLst>
+            <pc:docMk/>
+            <pc:sldMk cId="1723375323" sldId="257"/>
+            <ac:grpSpMk id="201" creationId="{69A204E1-6539-AB43-9FA3-4E01862A3250}"/>
+          </ac:grpSpMkLst>
+        </pc:grpChg>
+        <pc:cxnChg chg="add del mod">
+          <ac:chgData name="Burleyson, Casey D" userId="b4ad0ccb-f19a-4f64-98e6-0a4e417b5212" providerId="ADAL" clId="{42F185BA-E944-7349-BD1D-9F7EEEFEAF9E}" dt="2022-03-05T00:55:55.504" v="333" actId="478"/>
+          <ac:cxnSpMkLst>
+            <pc:docMk/>
+            <pc:sldMk cId="1723375323" sldId="257"/>
+            <ac:cxnSpMk id="14" creationId="{C1C487C2-7B51-974F-9D52-E72E64FB777F}"/>
+          </ac:cxnSpMkLst>
+        </pc:cxnChg>
+        <pc:cxnChg chg="add del">
+          <ac:chgData name="Burleyson, Casey D" userId="b4ad0ccb-f19a-4f64-98e6-0a4e417b5212" providerId="ADAL" clId="{42F185BA-E944-7349-BD1D-9F7EEEFEAF9E}" dt="2022-03-05T00:56:20.670" v="335" actId="478"/>
+          <ac:cxnSpMkLst>
+            <pc:docMk/>
+            <pc:sldMk cId="1723375323" sldId="257"/>
+            <ac:cxnSpMk id="16" creationId="{C7642AEB-6540-694E-B47C-F9C04FDB81F2}"/>
+          </ac:cxnSpMkLst>
+        </pc:cxnChg>
+        <pc:cxnChg chg="mod">
+          <ac:chgData name="Burleyson, Casey D" userId="b4ad0ccb-f19a-4f64-98e6-0a4e417b5212" providerId="ADAL" clId="{42F185BA-E944-7349-BD1D-9F7EEEFEAF9E}" dt="2022-03-05T01:04:42.029" v="568" actId="692"/>
+          <ac:cxnSpMkLst>
+            <pc:docMk/>
+            <pc:sldMk cId="1723375323" sldId="257"/>
+            <ac:cxnSpMk id="32" creationId="{439FDA17-6630-C940-AE12-64A07E0CEDDB}"/>
+          </ac:cxnSpMkLst>
+        </pc:cxnChg>
+        <pc:cxnChg chg="mod">
+          <ac:chgData name="Burleyson, Casey D" userId="b4ad0ccb-f19a-4f64-98e6-0a4e417b5212" providerId="ADAL" clId="{42F185BA-E944-7349-BD1D-9F7EEEFEAF9E}" dt="2022-03-05T01:04:38.050" v="567" actId="692"/>
+          <ac:cxnSpMkLst>
+            <pc:docMk/>
+            <pc:sldMk cId="1723375323" sldId="257"/>
+            <ac:cxnSpMk id="33" creationId="{971A11EC-8682-EB4E-A825-3E5E292E8968}"/>
+          </ac:cxnSpMkLst>
+        </pc:cxnChg>
+        <pc:cxnChg chg="mod">
+          <ac:chgData name="Burleyson, Casey D" userId="b4ad0ccb-f19a-4f64-98e6-0a4e417b5212" providerId="ADAL" clId="{42F185BA-E944-7349-BD1D-9F7EEEFEAF9E}" dt="2022-03-05T01:04:52.189" v="569" actId="692"/>
+          <ac:cxnSpMkLst>
+            <pc:docMk/>
+            <pc:sldMk cId="1723375323" sldId="257"/>
+            <ac:cxnSpMk id="34" creationId="{3C6463E1-19F2-2D4C-9159-AC78D23CB3CD}"/>
+          </ac:cxnSpMkLst>
+        </pc:cxnChg>
+        <pc:cxnChg chg="mod">
+          <ac:chgData name="Burleyson, Casey D" userId="b4ad0ccb-f19a-4f64-98e6-0a4e417b5212" providerId="ADAL" clId="{42F185BA-E944-7349-BD1D-9F7EEEFEAF9E}" dt="2022-03-05T01:04:03.274" v="549" actId="692"/>
+          <ac:cxnSpMkLst>
+            <pc:docMk/>
+            <pc:sldMk cId="1723375323" sldId="257"/>
+            <ac:cxnSpMk id="37" creationId="{897F4E8B-5A67-0844-8D12-CD663D71BDA6}"/>
+          </ac:cxnSpMkLst>
+        </pc:cxnChg>
+        <pc:cxnChg chg="mod">
+          <ac:chgData name="Burleyson, Casey D" userId="b4ad0ccb-f19a-4f64-98e6-0a4e417b5212" providerId="ADAL" clId="{42F185BA-E944-7349-BD1D-9F7EEEFEAF9E}" dt="2022-03-05T01:03:54.870" v="546" actId="692"/>
+          <ac:cxnSpMkLst>
+            <pc:docMk/>
+            <pc:sldMk cId="1723375323" sldId="257"/>
+            <ac:cxnSpMk id="38" creationId="{CA0D5344-7BE4-EC49-B045-776F70B053F7}"/>
+          </ac:cxnSpMkLst>
+        </pc:cxnChg>
+        <pc:cxnChg chg="add mod">
+          <ac:chgData name="Burleyson, Casey D" userId="b4ad0ccb-f19a-4f64-98e6-0a4e417b5212" providerId="ADAL" clId="{42F185BA-E944-7349-BD1D-9F7EEEFEAF9E}" dt="2022-03-05T01:01:10.589" v="451" actId="14100"/>
+          <ac:cxnSpMkLst>
+            <pc:docMk/>
+            <pc:sldMk cId="1723375323" sldId="257"/>
+            <ac:cxnSpMk id="40" creationId="{5C96A930-84BC-3041-A1C2-0838C211D222}"/>
+          </ac:cxnSpMkLst>
+        </pc:cxnChg>
+        <pc:cxnChg chg="mod">
+          <ac:chgData name="Burleyson, Casey D" userId="b4ad0ccb-f19a-4f64-98e6-0a4e417b5212" providerId="ADAL" clId="{42F185BA-E944-7349-BD1D-9F7EEEFEAF9E}" dt="2022-03-05T01:04:17.427" v="557" actId="692"/>
+          <ac:cxnSpMkLst>
+            <pc:docMk/>
+            <pc:sldMk cId="1723375323" sldId="257"/>
+            <ac:cxnSpMk id="51" creationId="{877BEA82-29F3-8043-96DA-3059B56510EE}"/>
+          </ac:cxnSpMkLst>
+        </pc:cxnChg>
+        <pc:cxnChg chg="del mod">
+          <ac:chgData name="Burleyson, Casey D" userId="b4ad0ccb-f19a-4f64-98e6-0a4e417b5212" providerId="ADAL" clId="{42F185BA-E944-7349-BD1D-9F7EEEFEAF9E}" dt="2022-03-05T00:55:38.459" v="330" actId="478"/>
+          <ac:cxnSpMkLst>
+            <pc:docMk/>
+            <pc:sldMk cId="1723375323" sldId="257"/>
+            <ac:cxnSpMk id="55" creationId="{CEA84BEF-15C4-B648-8F64-0B66F85AD5B1}"/>
+          </ac:cxnSpMkLst>
+        </pc:cxnChg>
+        <pc:cxnChg chg="mod">
+          <ac:chgData name="Burleyson, Casey D" userId="b4ad0ccb-f19a-4f64-98e6-0a4e417b5212" providerId="ADAL" clId="{42F185BA-E944-7349-BD1D-9F7EEEFEAF9E}" dt="2022-03-05T01:04:06.188" v="550" actId="692"/>
+          <ac:cxnSpMkLst>
+            <pc:docMk/>
+            <pc:sldMk cId="1723375323" sldId="257"/>
+            <ac:cxnSpMk id="58" creationId="{02698802-ACA5-E94B-9B2D-D1C7AA99CA3F}"/>
+          </ac:cxnSpMkLst>
+        </pc:cxnChg>
+        <pc:cxnChg chg="mod">
+          <ac:chgData name="Burleyson, Casey D" userId="b4ad0ccb-f19a-4f64-98e6-0a4e417b5212" providerId="ADAL" clId="{42F185BA-E944-7349-BD1D-9F7EEEFEAF9E}" dt="2022-03-05T01:03:57.682" v="547" actId="692"/>
+          <ac:cxnSpMkLst>
+            <pc:docMk/>
+            <pc:sldMk cId="1723375323" sldId="257"/>
+            <ac:cxnSpMk id="64" creationId="{31D3CE99-F34F-C544-945B-85DA1EF12B3E}"/>
+          </ac:cxnSpMkLst>
+        </pc:cxnChg>
+        <pc:cxnChg chg="mod">
+          <ac:chgData name="Burleyson, Casey D" userId="b4ad0ccb-f19a-4f64-98e6-0a4e417b5212" providerId="ADAL" clId="{42F185BA-E944-7349-BD1D-9F7EEEFEAF9E}" dt="2022-03-05T01:04:08.989" v="551" actId="692"/>
+          <ac:cxnSpMkLst>
+            <pc:docMk/>
+            <pc:sldMk cId="1723375323" sldId="257"/>
+            <ac:cxnSpMk id="66" creationId="{3901C5BD-7D19-CC44-AD95-69A08C3FA09D}"/>
+          </ac:cxnSpMkLst>
+        </pc:cxnChg>
+        <pc:cxnChg chg="mod">
+          <ac:chgData name="Burleyson, Casey D" userId="b4ad0ccb-f19a-4f64-98e6-0a4e417b5212" providerId="ADAL" clId="{42F185BA-E944-7349-BD1D-9F7EEEFEAF9E}" dt="2022-03-05T01:04:24.580" v="564" actId="692"/>
+          <ac:cxnSpMkLst>
+            <pc:docMk/>
+            <pc:sldMk cId="1723375323" sldId="257"/>
+            <ac:cxnSpMk id="68" creationId="{5D61C376-75FA-0745-B2D3-1B26C2D5D9FE}"/>
+          </ac:cxnSpMkLst>
+        </pc:cxnChg>
+        <pc:cxnChg chg="del mod">
+          <ac:chgData name="Burleyson, Casey D" userId="b4ad0ccb-f19a-4f64-98e6-0a4e417b5212" providerId="ADAL" clId="{42F185BA-E944-7349-BD1D-9F7EEEFEAF9E}" dt="2022-03-05T00:46:16" v="16" actId="478"/>
+          <ac:cxnSpMkLst>
+            <pc:docMk/>
+            <pc:sldMk cId="1723375323" sldId="257"/>
+            <ac:cxnSpMk id="80" creationId="{BEA5E7F8-407A-344D-8F97-6D535B899065}"/>
+          </ac:cxnSpMkLst>
+        </pc:cxnChg>
+        <pc:cxnChg chg="del mod">
+          <ac:chgData name="Burleyson, Casey D" userId="b4ad0ccb-f19a-4f64-98e6-0a4e417b5212" providerId="ADAL" clId="{42F185BA-E944-7349-BD1D-9F7EEEFEAF9E}" dt="2022-03-05T00:46:46.803" v="71" actId="478"/>
+          <ac:cxnSpMkLst>
+            <pc:docMk/>
+            <pc:sldMk cId="1723375323" sldId="257"/>
+            <ac:cxnSpMk id="81" creationId="{CEE1025D-359D-AC41-BDC4-C109A6A6C0D0}"/>
+          </ac:cxnSpMkLst>
+        </pc:cxnChg>
+        <pc:cxnChg chg="add mod">
+          <ac:chgData name="Burleyson, Casey D" userId="b4ad0ccb-f19a-4f64-98e6-0a4e417b5212" providerId="ADAL" clId="{42F185BA-E944-7349-BD1D-9F7EEEFEAF9E}" dt="2022-03-05T01:04:27.112" v="565" actId="692"/>
+          <ac:cxnSpMkLst>
+            <pc:docMk/>
+            <pc:sldMk cId="1723375323" sldId="257"/>
+            <ac:cxnSpMk id="82" creationId="{E7393740-2167-1742-B862-37826BBA8F5F}"/>
+          </ac:cxnSpMkLst>
+        </pc:cxnChg>
+        <pc:cxnChg chg="mod">
+          <ac:chgData name="Burleyson, Casey D" userId="b4ad0ccb-f19a-4f64-98e6-0a4e417b5212" providerId="ADAL" clId="{42F185BA-E944-7349-BD1D-9F7EEEFEAF9E}" dt="2022-03-05T01:04:34.828" v="566" actId="692"/>
+          <ac:cxnSpMkLst>
+            <pc:docMk/>
+            <pc:sldMk cId="1723375323" sldId="257"/>
+            <ac:cxnSpMk id="83" creationId="{69548FD6-53F9-AD44-8CE5-D9818ECA1380}"/>
+          </ac:cxnSpMkLst>
+        </pc:cxnChg>
+        <pc:cxnChg chg="add mod">
+          <ac:chgData name="Burleyson, Casey D" userId="b4ad0ccb-f19a-4f64-98e6-0a4e417b5212" providerId="ADAL" clId="{42F185BA-E944-7349-BD1D-9F7EEEFEAF9E}" dt="2022-03-05T01:03:47.051" v="544" actId="692"/>
+          <ac:cxnSpMkLst>
+            <pc:docMk/>
+            <pc:sldMk cId="1723375323" sldId="257"/>
+            <ac:cxnSpMk id="84" creationId="{242EC4CD-2D81-6545-B429-1114C5D150B7}"/>
+          </ac:cxnSpMkLst>
+        </pc:cxnChg>
+        <pc:cxnChg chg="add mod">
+          <ac:chgData name="Burleyson, Casey D" userId="b4ad0ccb-f19a-4f64-98e6-0a4e417b5212" providerId="ADAL" clId="{42F185BA-E944-7349-BD1D-9F7EEEFEAF9E}" dt="2022-03-05T01:03:50.482" v="545" actId="692"/>
+          <ac:cxnSpMkLst>
+            <pc:docMk/>
+            <pc:sldMk cId="1723375323" sldId="257"/>
+            <ac:cxnSpMk id="86" creationId="{36938572-468B-C14F-931C-08F086B9DF09}"/>
+          </ac:cxnSpMkLst>
+        </pc:cxnChg>
+        <pc:cxnChg chg="mod">
+          <ac:chgData name="Burleyson, Casey D" userId="b4ad0ccb-f19a-4f64-98e6-0a4e417b5212" providerId="ADAL" clId="{42F185BA-E944-7349-BD1D-9F7EEEFEAF9E}" dt="2022-03-05T01:03:44.600" v="543" actId="692"/>
+          <ac:cxnSpMkLst>
+            <pc:docMk/>
+            <pc:sldMk cId="1723375323" sldId="257"/>
+            <ac:cxnSpMk id="91" creationId="{89BF4FB9-954A-E14C-AAE4-734AEFCEE5B3}"/>
+          </ac:cxnSpMkLst>
+        </pc:cxnChg>
+        <pc:cxnChg chg="add del mod">
+          <ac:chgData name="Burleyson, Casey D" userId="b4ad0ccb-f19a-4f64-98e6-0a4e417b5212" providerId="ADAL" clId="{42F185BA-E944-7349-BD1D-9F7EEEFEAF9E}" dt="2022-03-05T01:00:13.545" v="430" actId="478"/>
+          <ac:cxnSpMkLst>
+            <pc:docMk/>
+            <pc:sldMk cId="1723375323" sldId="257"/>
+            <ac:cxnSpMk id="94" creationId="{EE7D937B-E817-E049-B85A-82655131FB47}"/>
+          </ac:cxnSpMkLst>
+        </pc:cxnChg>
+        <pc:cxnChg chg="add del mod">
+          <ac:chgData name="Burleyson, Casey D" userId="b4ad0ccb-f19a-4f64-98e6-0a4e417b5212" providerId="ADAL" clId="{42F185BA-E944-7349-BD1D-9F7EEEFEAF9E}" dt="2022-03-05T01:00:11.715" v="429" actId="478"/>
+          <ac:cxnSpMkLst>
+            <pc:docMk/>
+            <pc:sldMk cId="1723375323" sldId="257"/>
+            <ac:cxnSpMk id="97" creationId="{B90764EB-23C4-1246-87B4-9F181AE7FEA4}"/>
+          </ac:cxnSpMkLst>
+        </pc:cxnChg>
+        <pc:cxnChg chg="add del mod">
+          <ac:chgData name="Burleyson, Casey D" userId="b4ad0ccb-f19a-4f64-98e6-0a4e417b5212" providerId="ADAL" clId="{42F185BA-E944-7349-BD1D-9F7EEEFEAF9E}" dt="2022-03-05T00:58:57.633" v="378"/>
+          <ac:cxnSpMkLst>
+            <pc:docMk/>
+            <pc:sldMk cId="1723375323" sldId="257"/>
+            <ac:cxnSpMk id="98" creationId="{59418C80-1004-0641-9777-14A15182D618}"/>
+          </ac:cxnSpMkLst>
+        </pc:cxnChg>
+        <pc:cxnChg chg="mod">
+          <ac:chgData name="Burleyson, Casey D" userId="b4ad0ccb-f19a-4f64-98e6-0a4e417b5212" providerId="ADAL" clId="{42F185BA-E944-7349-BD1D-9F7EEEFEAF9E}" dt="2022-03-05T01:04:58.243" v="570" actId="692"/>
+          <ac:cxnSpMkLst>
+            <pc:docMk/>
+            <pc:sldMk cId="1723375323" sldId="257"/>
+            <ac:cxnSpMk id="105" creationId="{73B9BD94-6408-2543-A519-C1CD9111297A}"/>
+          </ac:cxnSpMkLst>
+        </pc:cxnChg>
+        <pc:cxnChg chg="add mod">
+          <ac:chgData name="Burleyson, Casey D" userId="b4ad0ccb-f19a-4f64-98e6-0a4e417b5212" providerId="ADAL" clId="{42F185BA-E944-7349-BD1D-9F7EEEFEAF9E}" dt="2022-03-05T01:01:07.384" v="450" actId="14100"/>
+          <ac:cxnSpMkLst>
+            <pc:docMk/>
+            <pc:sldMk cId="1723375323" sldId="257"/>
+            <ac:cxnSpMk id="106" creationId="{8C935D2A-E3B6-6944-9601-E9768D46D807}"/>
+          </ac:cxnSpMkLst>
+        </pc:cxnChg>
+        <pc:cxnChg chg="add mod">
+          <ac:chgData name="Burleyson, Casey D" userId="b4ad0ccb-f19a-4f64-98e6-0a4e417b5212" providerId="ADAL" clId="{42F185BA-E944-7349-BD1D-9F7EEEFEAF9E}" dt="2022-03-05T01:01:03.627" v="449" actId="14100"/>
+          <ac:cxnSpMkLst>
+            <pc:docMk/>
+            <pc:sldMk cId="1723375323" sldId="257"/>
+            <ac:cxnSpMk id="109" creationId="{61B45BE4-D6DA-8F48-B61A-51C2C4E75204}"/>
+          </ac:cxnSpMkLst>
+        </pc:cxnChg>
+        <pc:cxnChg chg="add mod">
+          <ac:chgData name="Burleyson, Casey D" userId="b4ad0ccb-f19a-4f64-98e6-0a4e417b5212" providerId="ADAL" clId="{42F185BA-E944-7349-BD1D-9F7EEEFEAF9E}" dt="2022-03-05T01:01:22.705" v="455" actId="14100"/>
+          <ac:cxnSpMkLst>
+            <pc:docMk/>
+            <pc:sldMk cId="1723375323" sldId="257"/>
+            <ac:cxnSpMk id="115" creationId="{84B73658-5FF1-BE4D-A839-5F97D1CADEF1}"/>
+          </ac:cxnSpMkLst>
+        </pc:cxnChg>
+        <pc:cxnChg chg="mod">
+          <ac:chgData name="Burleyson, Casey D" userId="b4ad0ccb-f19a-4f64-98e6-0a4e417b5212" providerId="ADAL" clId="{42F185BA-E944-7349-BD1D-9F7EEEFEAF9E}" dt="2022-03-05T01:04:00.360" v="548" actId="692"/>
+          <ac:cxnSpMkLst>
+            <pc:docMk/>
+            <pc:sldMk cId="1723375323" sldId="257"/>
+            <ac:cxnSpMk id="185" creationId="{B58B2C01-150D-F94A-9DF6-9F2C02927DF4}"/>
+          </ac:cxnSpMkLst>
+        </pc:cxnChg>
+        <pc:cxnChg chg="mod topLvl">
+          <ac:chgData name="Burleyson, Casey D" userId="b4ad0ccb-f19a-4f64-98e6-0a4e417b5212" providerId="ADAL" clId="{42F185BA-E944-7349-BD1D-9F7EEEFEAF9E}" dt="2022-03-05T00:50:50.223" v="238" actId="338"/>
+          <ac:cxnSpMkLst>
+            <pc:docMk/>
+            <pc:sldMk cId="1723375323" sldId="257"/>
+            <ac:cxnSpMk id="204" creationId="{6CCA6508-87D9-8B4D-930D-E1A1CDDB9EDE}"/>
+          </ac:cxnSpMkLst>
+        </pc:cxnChg>
+      </pc:sldChg>
+    </pc:docChg>
+  </pc:docChgLst>
+</pc:chgInfo>
+</file>
+
 <file path=ppt/slideLayouts/slideLayout1.xml><?xml version="1.0" encoding="utf-8"?>
 <p:sldLayout xmlns:a="http://schemas.openxmlformats.org/drawingml/2006/main" xmlns:r="http://schemas.openxmlformats.org/officeDocument/2006/relationships" xmlns:p="http://schemas.openxmlformats.org/presentationml/2006/main" type="title" preserve="1">
   <p:cSld name="Title Slide">
@@ -259,7 +816,7 @@
           <a:p>
             <a:fld id="{50E52EA3-2204-804F-9678-85900D481E2E}" type="datetimeFigureOut">
               <a:rPr lang="en-US" smtClean="0"/>
-              <a:t>2/18/22</a:t>
+              <a:t>3/4/22</a:t>
             </a:fld>
             <a:endParaRPr lang="en-US"/>
           </a:p>
@@ -457,7 +1014,7 @@
           <a:p>
             <a:fld id="{50E52EA3-2204-804F-9678-85900D481E2E}" type="datetimeFigureOut">
               <a:rPr lang="en-US" smtClean="0"/>
-              <a:t>2/18/22</a:t>
+              <a:t>3/4/22</a:t>
             </a:fld>
             <a:endParaRPr lang="en-US"/>
           </a:p>
@@ -665,7 +1222,7 @@
           <a:p>
             <a:fld id="{50E52EA3-2204-804F-9678-85900D481E2E}" type="datetimeFigureOut">
               <a:rPr lang="en-US" smtClean="0"/>
-              <a:t>2/18/22</a:t>
+              <a:t>3/4/22</a:t>
             </a:fld>
             <a:endParaRPr lang="en-US"/>
           </a:p>
@@ -863,7 +1420,7 @@
           <a:p>
             <a:fld id="{50E52EA3-2204-804F-9678-85900D481E2E}" type="datetimeFigureOut">
               <a:rPr lang="en-US" smtClean="0"/>
-              <a:t>2/18/22</a:t>
+              <a:t>3/4/22</a:t>
             </a:fld>
             <a:endParaRPr lang="en-US"/>
           </a:p>
@@ -1138,7 +1695,7 @@
           <a:p>
             <a:fld id="{50E52EA3-2204-804F-9678-85900D481E2E}" type="datetimeFigureOut">
               <a:rPr lang="en-US" smtClean="0"/>
-              <a:t>2/18/22</a:t>
+              <a:t>3/4/22</a:t>
             </a:fld>
             <a:endParaRPr lang="en-US"/>
           </a:p>
@@ -1403,7 +1960,7 @@
           <a:p>
             <a:fld id="{50E52EA3-2204-804F-9678-85900D481E2E}" type="datetimeFigureOut">
               <a:rPr lang="en-US" smtClean="0"/>
-              <a:t>2/18/22</a:t>
+              <a:t>3/4/22</a:t>
             </a:fld>
             <a:endParaRPr lang="en-US"/>
           </a:p>
@@ -1815,7 +2372,7 @@
           <a:p>
             <a:fld id="{50E52EA3-2204-804F-9678-85900D481E2E}" type="datetimeFigureOut">
               <a:rPr lang="en-US" smtClean="0"/>
-              <a:t>2/18/22</a:t>
+              <a:t>3/4/22</a:t>
             </a:fld>
             <a:endParaRPr lang="en-US"/>
           </a:p>
@@ -1956,7 +2513,7 @@
           <a:p>
             <a:fld id="{50E52EA3-2204-804F-9678-85900D481E2E}" type="datetimeFigureOut">
               <a:rPr lang="en-US" smtClean="0"/>
-              <a:t>2/18/22</a:t>
+              <a:t>3/4/22</a:t>
             </a:fld>
             <a:endParaRPr lang="en-US"/>
           </a:p>
@@ -2069,7 +2626,7 @@
           <a:p>
             <a:fld id="{50E52EA3-2204-804F-9678-85900D481E2E}" type="datetimeFigureOut">
               <a:rPr lang="en-US" smtClean="0"/>
-              <a:t>2/18/22</a:t>
+              <a:t>3/4/22</a:t>
             </a:fld>
             <a:endParaRPr lang="en-US"/>
           </a:p>
@@ -2380,7 +2937,7 @@
           <a:p>
             <a:fld id="{50E52EA3-2204-804F-9678-85900D481E2E}" type="datetimeFigureOut">
               <a:rPr lang="en-US" smtClean="0"/>
-              <a:t>2/18/22</a:t>
+              <a:t>3/4/22</a:t>
             </a:fld>
             <a:endParaRPr lang="en-US"/>
           </a:p>
@@ -2668,7 +3225,7 @@
           <a:p>
             <a:fld id="{50E52EA3-2204-804F-9678-85900D481E2E}" type="datetimeFigureOut">
               <a:rPr lang="en-US" smtClean="0"/>
-              <a:t>2/18/22</a:t>
+              <a:t>3/4/22</a:t>
             </a:fld>
             <a:endParaRPr lang="en-US"/>
           </a:p>
@@ -2909,7 +3466,7 @@
           <a:p>
             <a:fld id="{50E52EA3-2204-804F-9678-85900D481E2E}" type="datetimeFigureOut">
               <a:rPr lang="en-US" smtClean="0"/>
-              <a:t>2/18/22</a:t>
+              <a:t>3/4/22</a:t>
             </a:fld>
             <a:endParaRPr lang="en-US"/>
           </a:p>
@@ -3509,10 +4066,14 @@
             <a:avLst/>
           </a:prstGeom>
           <a:solidFill>
-            <a:srgbClr val="00B050"/>
+            <a:schemeClr val="bg1">
+              <a:lumMod val="50000"/>
+            </a:schemeClr>
           </a:solidFill>
-          <a:ln w="12700" cap="flat" cmpd="sng" algn="ctr">
-            <a:noFill/>
+          <a:ln w="25400" cap="flat" cmpd="sng" algn="ctr">
+            <a:solidFill>
+              <a:schemeClr val="tx1"/>
+            </a:solidFill>
             <a:prstDash val="solid"/>
             <a:miter lim="800000"/>
           </a:ln>
@@ -3763,12 +4324,14 @@
             <a:avLst/>
           </a:prstGeom>
           <a:solidFill>
-            <a:srgbClr val="FFFFFF">
+            <a:schemeClr val="bg1">
               <a:lumMod val="50000"/>
-            </a:srgbClr>
+            </a:schemeClr>
           </a:solidFill>
-          <a:ln w="12700" cap="flat" cmpd="sng" algn="ctr">
-            <a:noFill/>
+          <a:ln w="25400" cap="flat" cmpd="sng" algn="ctr">
+            <a:solidFill>
+              <a:schemeClr val="tx1"/>
+            </a:solidFill>
             <a:prstDash val="solid"/>
             <a:miter lim="800000"/>
           </a:ln>
@@ -3853,277 +4416,6 @@
                 <a:sym typeface="Arial"/>
               </a:rPr>
               <a:t>(GCAM-USA)</a:t>
-            </a:r>
-          </a:p>
-        </p:txBody>
-      </p:sp>
-      <p:sp>
-        <p:nvSpPr>
-          <p:cNvPr id="29" name="Oval 28">
-            <a:extLst>
-              <a:ext uri="{FF2B5EF4-FFF2-40B4-BE49-F238E27FC236}">
-                <a16:creationId xmlns:a16="http://schemas.microsoft.com/office/drawing/2014/main" id="{F56FB104-9D0D-D245-80A2-BC882529750C}"/>
-              </a:ext>
-            </a:extLst>
-          </p:cNvPr>
-          <p:cNvSpPr/>
-          <p:nvPr/>
-        </p:nvSpPr>
-        <p:spPr>
-          <a:xfrm>
-            <a:off x="74447" y="883217"/>
-            <a:ext cx="1271016" cy="462009"/>
-          </a:xfrm>
-          <a:prstGeom prst="ellipse">
-            <a:avLst/>
-          </a:prstGeom>
-          <a:solidFill>
-            <a:srgbClr val="307F9C"/>
-          </a:solidFill>
-          <a:ln w="12700" cap="flat" cmpd="sng" algn="ctr">
-            <a:noFill/>
-            <a:prstDash val="solid"/>
-            <a:miter lim="800000"/>
-          </a:ln>
-          <a:effectLst/>
-        </p:spPr>
-        <p:txBody>
-          <a:bodyPr rtlCol="0" anchor="ctr"/>
-          <a:lstStyle/>
-          <a:p>
-            <a:pPr marL="0" marR="0" lvl="0" indent="0" algn="ctr" defTabSz="914400" eaLnBrk="1" fontAlgn="auto" latinLnBrk="0" hangingPunct="1">
-              <a:lnSpc>
-                <a:spcPct val="100000"/>
-              </a:lnSpc>
-              <a:spcBef>
-                <a:spcPts val="0"/>
-              </a:spcBef>
-              <a:spcAft>
-                <a:spcPts val="0"/>
-              </a:spcAft>
-              <a:buClr>
-                <a:srgbClr val="000000"/>
-              </a:buClr>
-              <a:buSzTx/>
-              <a:buFont typeface="Arial"/>
-              <a:buNone/>
-              <a:tabLst/>
-              <a:defRPr/>
-            </a:pPr>
-            <a:r>
-              <a:rPr kumimoji="0" lang="en-US" sz="1200" b="0" i="0" u="none" strike="noStrike" kern="0" cap="none" spc="0" normalizeH="0" baseline="0" noProof="0" dirty="0">
-                <a:ln>
-                  <a:noFill/>
-                </a:ln>
-                <a:solidFill>
-                  <a:srgbClr val="FFFFFF"/>
-                </a:solidFill>
-                <a:effectLst/>
-                <a:uLnTx/>
-                <a:uFillTx/>
-                <a:latin typeface="Calibri" panose="020F0502020204030204"/>
-                <a:ea typeface="+mn-ea"/>
-                <a:cs typeface="+mn-cs"/>
-                <a:sym typeface="Arial"/>
-              </a:rPr>
-              <a:t>Exogenous Scenario</a:t>
-            </a:r>
-          </a:p>
-        </p:txBody>
-      </p:sp>
-      <p:sp>
-        <p:nvSpPr>
-          <p:cNvPr id="30" name="Rounded Rectangle 29">
-            <a:extLst>
-              <a:ext uri="{FF2B5EF4-FFF2-40B4-BE49-F238E27FC236}">
-                <a16:creationId xmlns:a16="http://schemas.microsoft.com/office/drawing/2014/main" id="{1B0B6E02-C7EB-6740-BB61-7222D35DD413}"/>
-              </a:ext>
-            </a:extLst>
-          </p:cNvPr>
-          <p:cNvSpPr/>
-          <p:nvPr/>
-        </p:nvSpPr>
-        <p:spPr>
-          <a:xfrm>
-            <a:off x="113834" y="2511475"/>
-            <a:ext cx="1188720" cy="755612"/>
-          </a:xfrm>
-          <a:prstGeom prst="roundRect">
-            <a:avLst/>
-          </a:prstGeom>
-          <a:solidFill>
-            <a:srgbClr val="A44F2A">
-              <a:lumMod val="60000"/>
-              <a:lumOff val="40000"/>
-            </a:srgbClr>
-          </a:solidFill>
-          <a:ln w="12700" cap="flat" cmpd="sng" algn="ctr">
-            <a:noFill/>
-            <a:prstDash val="solid"/>
-            <a:miter lim="800000"/>
-          </a:ln>
-          <a:effectLst/>
-        </p:spPr>
-        <p:txBody>
-          <a:bodyPr rtlCol="0" anchor="ctr"/>
-          <a:lstStyle/>
-          <a:p>
-            <a:pPr marL="0" marR="0" lvl="0" indent="0" algn="ctr" defTabSz="914400" eaLnBrk="1" fontAlgn="auto" latinLnBrk="0" hangingPunct="1">
-              <a:lnSpc>
-                <a:spcPct val="100000"/>
-              </a:lnSpc>
-              <a:spcBef>
-                <a:spcPts val="0"/>
-              </a:spcBef>
-              <a:spcAft>
-                <a:spcPts val="0"/>
-              </a:spcAft>
-              <a:buClr>
-                <a:srgbClr val="000000"/>
-              </a:buClr>
-              <a:buSzTx/>
-              <a:buFont typeface="Arial"/>
-              <a:buNone/>
-              <a:tabLst/>
-              <a:defRPr/>
-            </a:pPr>
-            <a:r>
-              <a:rPr kumimoji="0" lang="en-US" sz="1200" b="0" i="0" u="none" strike="noStrike" kern="0" cap="none" spc="0" normalizeH="0" baseline="0" noProof="0" dirty="0">
-                <a:ln>
-                  <a:noFill/>
-                </a:ln>
-                <a:solidFill>
-                  <a:srgbClr val="FFFFFF"/>
-                </a:solidFill>
-                <a:effectLst/>
-                <a:uLnTx/>
-                <a:uFillTx/>
-                <a:latin typeface="Calibri" panose="020F0502020204030204"/>
-                <a:ea typeface="+mn-ea"/>
-                <a:cs typeface="+mn-cs"/>
-                <a:sym typeface="Arial"/>
-              </a:rPr>
-              <a:t>Capability developed in Phase 1</a:t>
-            </a:r>
-          </a:p>
-          <a:p>
-            <a:pPr marL="0" marR="0" lvl="0" indent="0" algn="ctr" defTabSz="914400" eaLnBrk="1" fontAlgn="auto" latinLnBrk="0" hangingPunct="1">
-              <a:lnSpc>
-                <a:spcPct val="100000"/>
-              </a:lnSpc>
-              <a:spcBef>
-                <a:spcPts val="0"/>
-              </a:spcBef>
-              <a:spcAft>
-                <a:spcPts val="0"/>
-              </a:spcAft>
-              <a:buClr>
-                <a:srgbClr val="000000"/>
-              </a:buClr>
-              <a:buSzTx/>
-              <a:buFont typeface="Arial"/>
-              <a:buNone/>
-              <a:tabLst/>
-              <a:defRPr/>
-            </a:pPr>
-            <a:r>
-              <a:rPr lang="en-US" sz="1100" kern="0" dirty="0">
-                <a:solidFill>
-                  <a:srgbClr val="FFFFFF"/>
-                </a:solidFill>
-                <a:latin typeface="Calibri" panose="020F0502020204030204"/>
-                <a:sym typeface="Arial"/>
-              </a:rPr>
-              <a:t>(* = w/ GCIMS)</a:t>
-            </a:r>
-            <a:endParaRPr kumimoji="0" lang="en-US" sz="1100" b="0" i="0" u="none" strike="noStrike" kern="0" cap="none" spc="0" normalizeH="0" baseline="0" noProof="0" dirty="0">
-              <a:ln>
-                <a:noFill/>
-              </a:ln>
-              <a:solidFill>
-                <a:srgbClr val="FFFFFF"/>
-              </a:solidFill>
-              <a:effectLst/>
-              <a:uLnTx/>
-              <a:uFillTx/>
-              <a:latin typeface="Calibri" panose="020F0502020204030204"/>
-              <a:ea typeface="+mn-ea"/>
-              <a:cs typeface="+mn-cs"/>
-              <a:sym typeface="Arial"/>
-            </a:endParaRPr>
-          </a:p>
-        </p:txBody>
-      </p:sp>
-      <p:sp>
-        <p:nvSpPr>
-          <p:cNvPr id="31" name="Rounded Rectangle 30">
-            <a:extLst>
-              <a:ext uri="{FF2B5EF4-FFF2-40B4-BE49-F238E27FC236}">
-                <a16:creationId xmlns:a16="http://schemas.microsoft.com/office/drawing/2014/main" id="{64DE08EC-9A73-5D41-A228-A2A023250EB5}"/>
-              </a:ext>
-            </a:extLst>
-          </p:cNvPr>
-          <p:cNvSpPr/>
-          <p:nvPr/>
-        </p:nvSpPr>
-        <p:spPr>
-          <a:xfrm>
-            <a:off x="113834" y="4649445"/>
-            <a:ext cx="1188720" cy="802758"/>
-          </a:xfrm>
-          <a:prstGeom prst="roundRect">
-            <a:avLst/>
-          </a:prstGeom>
-          <a:solidFill>
-            <a:srgbClr val="00B050"/>
-          </a:solidFill>
-          <a:ln w="12700" cap="flat" cmpd="sng" algn="ctr">
-            <a:noFill/>
-            <a:prstDash val="solid"/>
-            <a:miter lim="800000"/>
-          </a:ln>
-          <a:effectLst/>
-        </p:spPr>
-        <p:txBody>
-          <a:bodyPr rtlCol="0" anchor="ctr"/>
-          <a:lstStyle/>
-          <a:p>
-            <a:pPr marL="0" marR="0" lvl="0" indent="0" algn="ctr" defTabSz="914400" eaLnBrk="1" fontAlgn="auto" latinLnBrk="0" hangingPunct="1">
-              <a:lnSpc>
-                <a:spcPct val="100000"/>
-              </a:lnSpc>
-              <a:spcBef>
-                <a:spcPts val="0"/>
-              </a:spcBef>
-              <a:spcAft>
-                <a:spcPts val="0"/>
-              </a:spcAft>
-              <a:buClr>
-                <a:srgbClr val="000000"/>
-              </a:buClr>
-              <a:buSzTx/>
-              <a:buFont typeface="Arial"/>
-              <a:buNone/>
-              <a:tabLst/>
-              <a:defRPr/>
-            </a:pPr>
-            <a:r>
-              <a:rPr kumimoji="0" lang="en-US" sz="1200" b="0" i="0" u="none" strike="noStrike" kern="0" cap="none" spc="0" normalizeH="0" baseline="0" noProof="0" dirty="0">
-                <a:ln>
-                  <a:noFill/>
-                </a:ln>
-                <a:solidFill>
-                  <a:srgbClr val="FFFFFF"/>
-                </a:solidFill>
-                <a:effectLst/>
-                <a:uLnTx/>
-                <a:uFillTx/>
-                <a:latin typeface="Calibri" panose="020F0502020204030204"/>
-                <a:ea typeface="+mn-ea"/>
-                <a:cs typeface="+mn-cs"/>
-                <a:sym typeface="Arial"/>
-              </a:rPr>
-              <a:t>Developed for Phase 2</a:t>
             </a:r>
           </a:p>
         </p:txBody>
@@ -4155,11 +4447,9 @@
             </a:avLst>
           </a:prstGeom>
           <a:noFill/>
-          <a:ln w="28575" cap="flat" cmpd="sng" algn="ctr">
+          <a:ln w="25400" cap="flat" cmpd="sng" algn="ctr">
             <a:solidFill>
-              <a:srgbClr val="FFFFFF">
-                <a:lumMod val="50000"/>
-              </a:srgbClr>
+              <a:schemeClr val="tx1"/>
             </a:solidFill>
             <a:prstDash val="solid"/>
             <a:miter lim="800000"/>
@@ -4195,11 +4485,9 @@
             </a:avLst>
           </a:prstGeom>
           <a:noFill/>
-          <a:ln w="28575" cap="flat" cmpd="sng" algn="ctr">
+          <a:ln w="25400" cap="flat" cmpd="sng" algn="ctr">
             <a:solidFill>
-              <a:srgbClr val="FFFFFF">
-                <a:lumMod val="50000"/>
-              </a:srgbClr>
+              <a:schemeClr val="tx1"/>
             </a:solidFill>
             <a:prstDash val="solid"/>
             <a:miter lim="800000"/>
@@ -4232,9 +4520,9 @@
             <a:avLst/>
           </a:prstGeom>
           <a:noFill/>
-          <a:ln w="28575" cap="flat" cmpd="sng" algn="ctr">
+          <a:ln w="25400" cap="flat" cmpd="sng" algn="ctr">
             <a:solidFill>
-              <a:srgbClr val="00B050"/>
+              <a:schemeClr val="tx1"/>
             </a:solidFill>
             <a:prstDash val="solid"/>
             <a:miter lim="800000"/>
@@ -4243,55 +4531,6 @@
           <a:effectLst/>
         </p:spPr>
       </p:cxnSp>
-      <p:sp>
-        <p:nvSpPr>
-          <p:cNvPr id="35" name="TextBox 34">
-            <a:extLst>
-              <a:ext uri="{FF2B5EF4-FFF2-40B4-BE49-F238E27FC236}">
-                <a16:creationId xmlns:a16="http://schemas.microsoft.com/office/drawing/2014/main" id="{E18794E3-E5B7-084B-B1CC-6DE7E21ED13B}"/>
-              </a:ext>
-            </a:extLst>
-          </p:cNvPr>
-          <p:cNvSpPr txBox="1"/>
-          <p:nvPr/>
-        </p:nvSpPr>
-        <p:spPr>
-          <a:xfrm>
-            <a:off x="298467" y="458846"/>
-            <a:ext cx="819455" cy="307777"/>
-          </a:xfrm>
-          <a:prstGeom prst="rect">
-            <a:avLst/>
-          </a:prstGeom>
-          <a:noFill/>
-        </p:spPr>
-        <p:txBody>
-          <a:bodyPr wrap="none" rtlCol="0">
-            <a:spAutoFit/>
-          </a:bodyPr>
-          <a:lstStyle/>
-          <a:p>
-            <a:pPr>
-              <a:buClr>
-                <a:srgbClr val="000000"/>
-              </a:buClr>
-              <a:buFont typeface="Arial"/>
-              <a:buNone/>
-            </a:pPr>
-            <a:r>
-              <a:rPr lang="en-US" sz="1400" b="1" kern="0" dirty="0">
-                <a:solidFill>
-                  <a:srgbClr val="000000"/>
-                </a:solidFill>
-                <a:latin typeface="Arial"/>
-                <a:cs typeface="Arial"/>
-                <a:sym typeface="Arial"/>
-              </a:rPr>
-              <a:t>Legend</a:t>
-            </a:r>
-          </a:p>
-        </p:txBody>
-      </p:sp>
       <p:sp>
         <p:nvSpPr>
           <p:cNvPr id="36" name="Rounded Rectangle 35">
@@ -4313,10 +4552,14 @@
             <a:avLst/>
           </a:prstGeom>
           <a:solidFill>
-            <a:srgbClr val="00B050"/>
+            <a:schemeClr val="bg1">
+              <a:lumMod val="50000"/>
+            </a:schemeClr>
           </a:solidFill>
-          <a:ln w="12700" cap="flat" cmpd="sng" algn="ctr">
-            <a:noFill/>
+          <a:ln w="25400" cap="flat" cmpd="sng" algn="ctr">
+            <a:solidFill>
+              <a:schemeClr val="tx1"/>
+            </a:solidFill>
             <a:prstDash val="solid"/>
             <a:miter lim="800000"/>
           </a:ln>
@@ -4391,9 +4634,9 @@
             <a:avLst/>
           </a:prstGeom>
           <a:noFill/>
-          <a:ln w="28575" cap="flat" cmpd="sng" algn="ctr">
+          <a:ln w="25400" cap="flat" cmpd="sng" algn="ctr">
             <a:solidFill>
-              <a:srgbClr val="00B050"/>
+              <a:schemeClr val="tx1"/>
             </a:solidFill>
             <a:prstDash val="dash"/>
             <a:miter lim="800000"/>
@@ -4430,9 +4673,9 @@
             </a:avLst>
           </a:prstGeom>
           <a:noFill/>
-          <a:ln w="28575" cap="flat" cmpd="sng" algn="ctr">
+          <a:ln w="25400" cap="flat" cmpd="sng" algn="ctr">
             <a:solidFill>
-              <a:srgbClr val="00B050"/>
+              <a:schemeClr val="tx1"/>
             </a:solidFill>
             <a:prstDash val="sysDot"/>
             <a:miter lim="800000"/>
@@ -4626,82 +4869,6 @@
                 <a:sym typeface="Arial"/>
               </a:rPr>
               <a:t>Hourly (Nodal) </a:t>
-            </a:r>
-          </a:p>
-        </p:txBody>
-      </p:sp>
-      <p:sp>
-        <p:nvSpPr>
-          <p:cNvPr id="47" name="Rounded Rectangle 46">
-            <a:extLst>
-              <a:ext uri="{FF2B5EF4-FFF2-40B4-BE49-F238E27FC236}">
-                <a16:creationId xmlns:a16="http://schemas.microsoft.com/office/drawing/2014/main" id="{162E347A-AFA7-FD4B-BE36-BD8D6AF07312}"/>
-              </a:ext>
-            </a:extLst>
-          </p:cNvPr>
-          <p:cNvSpPr/>
-          <p:nvPr/>
-        </p:nvSpPr>
-        <p:spPr>
-          <a:xfrm>
-            <a:off x="113834" y="1499134"/>
-            <a:ext cx="1188720" cy="557349"/>
-          </a:xfrm>
-          <a:prstGeom prst="roundRect">
-            <a:avLst/>
-          </a:prstGeom>
-          <a:solidFill>
-            <a:srgbClr val="FFFFFF">
-              <a:lumMod val="50000"/>
-            </a:srgbClr>
-          </a:solidFill>
-          <a:ln w="12700" cap="flat" cmpd="sng" algn="ctr">
-            <a:noFill/>
-            <a:prstDash val="solid"/>
-            <a:miter lim="800000"/>
-          </a:ln>
-          <a:effectLst/>
-        </p:spPr>
-        <p:txBody>
-          <a:bodyPr rtlCol="0" anchor="ctr"/>
-          <a:lstStyle/>
-          <a:p>
-            <a:pPr marL="0" marR="0" lvl="0" indent="0" algn="ctr" defTabSz="914400" eaLnBrk="1" fontAlgn="auto" latinLnBrk="0" hangingPunct="1">
-              <a:lnSpc>
-                <a:spcPct val="100000"/>
-              </a:lnSpc>
-              <a:spcBef>
-                <a:spcPts val="0"/>
-              </a:spcBef>
-              <a:spcAft>
-                <a:spcPts val="0"/>
-              </a:spcAft>
-              <a:buClr>
-                <a:srgbClr val="000000"/>
-              </a:buClr>
-              <a:buSzTx/>
-              <a:buFont typeface="Arial"/>
-              <a:buNone/>
-              <a:tabLst/>
-              <a:defRPr/>
-            </a:pPr>
-            <a:r>
-              <a:rPr kumimoji="0" lang="en-US" sz="1200" b="0" i="0" u="none" strike="noStrike" kern="0" cap="none" spc="0" normalizeH="0" baseline="0" noProof="0" dirty="0">
-                <a:ln>
-                  <a:noFill/>
-                </a:ln>
-                <a:solidFill>
-                  <a:srgbClr val="FFFFFF"/>
-                </a:solidFill>
-                <a:effectLst/>
-                <a:uLnTx/>
-                <a:uFillTx/>
-                <a:latin typeface="Calibri" panose="020F0502020204030204"/>
-                <a:ea typeface="+mn-ea"/>
-                <a:cs typeface="+mn-cs"/>
-                <a:sym typeface="Arial"/>
-              </a:rPr>
-              <a:t>Pre-existing capability</a:t>
             </a:r>
           </a:p>
         </p:txBody>
@@ -4733,9 +4900,9 @@
             </a:avLst>
           </a:prstGeom>
           <a:noFill/>
-          <a:ln w="28575" cap="flat" cmpd="sng" algn="ctr">
+          <a:ln w="25400" cap="flat" cmpd="sng" algn="ctr">
             <a:solidFill>
-              <a:srgbClr val="00B050"/>
+              <a:schemeClr val="tx1"/>
             </a:solidFill>
             <a:prstDash val="dash"/>
             <a:miter lim="800000"/>
@@ -4765,14 +4932,13 @@
             <a:avLst/>
           </a:prstGeom>
           <a:solidFill>
-            <a:srgbClr val="A44F2A">
-              <a:lumMod val="60000"/>
-              <a:lumOff val="40000"/>
-            </a:srgbClr>
+            <a:schemeClr val="bg1">
+              <a:lumMod val="50000"/>
+            </a:schemeClr>
           </a:solidFill>
-          <a:ln w="28575" cap="flat" cmpd="sng" algn="ctr">
+          <a:ln w="25400" cap="flat" cmpd="sng" algn="ctr">
             <a:solidFill>
-              <a:srgbClr val="00B050"/>
+              <a:schemeClr val="tx1"/>
             </a:solidFill>
             <a:prstDash val="solid"/>
             <a:miter lim="800000"/>
@@ -4862,44 +5028,6 @@
           </a:p>
         </p:txBody>
       </p:sp>
-      <p:cxnSp>
-        <p:nvCxnSpPr>
-          <p:cNvPr id="55" name="Elbow Connector 54">
-            <a:extLst>
-              <a:ext uri="{FF2B5EF4-FFF2-40B4-BE49-F238E27FC236}">
-                <a16:creationId xmlns:a16="http://schemas.microsoft.com/office/drawing/2014/main" id="{CEA84BEF-15C4-B648-8F64-0B66F85AD5B1}"/>
-              </a:ext>
-            </a:extLst>
-          </p:cNvPr>
-          <p:cNvCxnSpPr>
-            <a:cxnSpLocks/>
-            <a:stCxn id="24" idx="0"/>
-            <a:endCxn id="54" idx="2"/>
-          </p:cNvCxnSpPr>
-          <p:nvPr/>
-        </p:nvCxnSpPr>
-        <p:spPr>
-          <a:xfrm rot="5400000" flipH="1" flipV="1">
-            <a:off x="6753993" y="2641631"/>
-            <a:ext cx="1819241" cy="3076440"/>
-          </a:xfrm>
-          <a:prstGeom prst="bentConnector3">
-            <a:avLst>
-              <a:gd name="adj1" fmla="val 65581"/>
-            </a:avLst>
-          </a:prstGeom>
-          <a:noFill/>
-          <a:ln w="28575" cap="flat" cmpd="sng" algn="ctr">
-            <a:solidFill>
-              <a:srgbClr val="00B050"/>
-            </a:solidFill>
-            <a:prstDash val="sysDot"/>
-            <a:miter lim="800000"/>
-            <a:tailEnd type="triangle" w="lg" len="lg"/>
-          </a:ln>
-          <a:effectLst/>
-        </p:spPr>
-      </p:cxnSp>
       <p:cxnSp>
         <p:nvCxnSpPr>
           <p:cNvPr id="58" name="Straight Arrow Connector 129">
@@ -4927,9 +5055,9 @@
             </a:avLst>
           </a:prstGeom>
           <a:noFill/>
-          <a:ln w="28575" cap="flat" cmpd="sng" algn="ctr">
+          <a:ln w="25400" cap="flat" cmpd="sng" algn="ctr">
             <a:solidFill>
-              <a:srgbClr val="00B050"/>
+              <a:schemeClr val="tx1"/>
             </a:solidFill>
             <a:prstDash val="dash"/>
             <a:miter lim="800000"/>
@@ -5099,9 +5227,9 @@
             </a:avLst>
           </a:prstGeom>
           <a:noFill/>
-          <a:ln w="28575" cap="flat" cmpd="sng" algn="ctr">
+          <a:ln w="25400" cap="flat" cmpd="sng" algn="ctr">
             <a:solidFill>
-              <a:srgbClr val="00B050"/>
+              <a:schemeClr val="tx1"/>
             </a:solidFill>
             <a:prstDash val="sysDot"/>
             <a:miter lim="800000"/>
@@ -5110,114 +5238,6 @@
           <a:effectLst/>
         </p:spPr>
       </p:cxnSp>
-      <p:grpSp>
-        <p:nvGrpSpPr>
-          <p:cNvPr id="188" name="Group 187">
-            <a:extLst>
-              <a:ext uri="{FF2B5EF4-FFF2-40B4-BE49-F238E27FC236}">
-                <a16:creationId xmlns:a16="http://schemas.microsoft.com/office/drawing/2014/main" id="{98F66DC2-D6E7-4447-96EA-82619906486A}"/>
-              </a:ext>
-            </a:extLst>
-          </p:cNvPr>
-          <p:cNvGrpSpPr/>
-          <p:nvPr/>
-        </p:nvGrpSpPr>
-        <p:grpSpPr>
-          <a:xfrm>
-            <a:off x="5918" y="2049483"/>
-            <a:ext cx="1404552" cy="273653"/>
-            <a:chOff x="231606" y="4728203"/>
-            <a:chExt cx="1404552" cy="273653"/>
-          </a:xfrm>
-        </p:grpSpPr>
-        <p:cxnSp>
-          <p:nvCxnSpPr>
-            <p:cNvPr id="61" name="Straight Arrow Connector 60">
-              <a:extLst>
-                <a:ext uri="{FF2B5EF4-FFF2-40B4-BE49-F238E27FC236}">
-                  <a16:creationId xmlns:a16="http://schemas.microsoft.com/office/drawing/2014/main" id="{19C13C44-542F-1144-82B1-2F719F2B3260}"/>
-                </a:ext>
-              </a:extLst>
-            </p:cNvPr>
-            <p:cNvCxnSpPr>
-              <a:cxnSpLocks/>
-            </p:cNvCxnSpPr>
-            <p:nvPr/>
-          </p:nvCxnSpPr>
-          <p:spPr>
-            <a:xfrm>
-              <a:off x="491290" y="5001856"/>
-              <a:ext cx="780983" cy="0"/>
-            </a:xfrm>
-            <a:prstGeom prst="straightConnector1">
-              <a:avLst/>
-            </a:prstGeom>
-            <a:noFill/>
-            <a:ln w="28575" cap="flat" cmpd="sng" algn="ctr">
-              <a:solidFill>
-                <a:schemeClr val="bg1">
-                  <a:lumMod val="50000"/>
-                </a:schemeClr>
-              </a:solidFill>
-              <a:prstDash val="solid"/>
-              <a:miter lim="800000"/>
-              <a:tailEnd type="triangle" w="lg" len="lg"/>
-            </a:ln>
-            <a:effectLst/>
-          </p:spPr>
-        </p:cxnSp>
-        <p:sp>
-          <p:nvSpPr>
-            <p:cNvPr id="162" name="TextBox 161">
-              <a:extLst>
-                <a:ext uri="{FF2B5EF4-FFF2-40B4-BE49-F238E27FC236}">
-                  <a16:creationId xmlns:a16="http://schemas.microsoft.com/office/drawing/2014/main" id="{A35E0840-8235-B846-BD36-417BC1BD0790}"/>
-                </a:ext>
-              </a:extLst>
-            </p:cNvPr>
-            <p:cNvSpPr txBox="1"/>
-            <p:nvPr/>
-          </p:nvSpPr>
-          <p:spPr>
-            <a:xfrm>
-              <a:off x="231606" y="4728203"/>
-              <a:ext cx="1404552" cy="246221"/>
-            </a:xfrm>
-            <a:prstGeom prst="rect">
-              <a:avLst/>
-            </a:prstGeom>
-            <a:noFill/>
-          </p:spPr>
-          <p:txBody>
-            <a:bodyPr wrap="none" rtlCol="0">
-              <a:spAutoFit/>
-            </a:bodyPr>
-            <a:lstStyle/>
-            <a:p>
-              <a:pPr algn="ctr">
-                <a:buClr>
-                  <a:srgbClr val="000000"/>
-                </a:buClr>
-                <a:buFont typeface="Arial"/>
-                <a:buNone/>
-              </a:pPr>
-              <a:r>
-                <a:rPr lang="en-US" sz="1000" kern="0" dirty="0">
-                  <a:solidFill>
-                    <a:schemeClr val="bg1">
-                      <a:lumMod val="50000"/>
-                    </a:schemeClr>
-                  </a:solidFill>
-                  <a:latin typeface="Arial"/>
-                  <a:cs typeface="Arial"/>
-                  <a:sym typeface="Arial"/>
-                </a:rPr>
-                <a:t>Pre-existing coupling </a:t>
-              </a:r>
-            </a:p>
-          </p:txBody>
-        </p:sp>
-      </p:grpSp>
       <p:cxnSp>
         <p:nvCxnSpPr>
           <p:cNvPr id="185" name="Straight Arrow Connector 129">
@@ -5242,9 +5262,9 @@
             <a:avLst/>
           </a:prstGeom>
           <a:noFill/>
-          <a:ln w="28575" cap="flat" cmpd="sng" algn="ctr">
+          <a:ln w="25400" cap="flat" cmpd="sng" algn="ctr">
             <a:solidFill>
-              <a:srgbClr val="00B050"/>
+              <a:schemeClr val="tx1"/>
             </a:solidFill>
             <a:prstDash val="sysDot"/>
             <a:miter lim="800000"/>
@@ -5254,308 +5274,6 @@
           <a:effectLst/>
         </p:spPr>
       </p:cxnSp>
-      <p:grpSp>
-        <p:nvGrpSpPr>
-          <p:cNvPr id="200" name="Group 199">
-            <a:extLst>
-              <a:ext uri="{FF2B5EF4-FFF2-40B4-BE49-F238E27FC236}">
-                <a16:creationId xmlns:a16="http://schemas.microsoft.com/office/drawing/2014/main" id="{7CF0757D-627E-D242-B3A9-BB84457764A5}"/>
-              </a:ext>
-            </a:extLst>
-          </p:cNvPr>
-          <p:cNvGrpSpPr/>
-          <p:nvPr/>
-        </p:nvGrpSpPr>
-        <p:grpSpPr>
-          <a:xfrm>
-            <a:off x="78054" y="3259831"/>
-            <a:ext cx="1260281" cy="286479"/>
-            <a:chOff x="257134" y="3597657"/>
-            <a:chExt cx="1260281" cy="286479"/>
-          </a:xfrm>
-        </p:grpSpPr>
-        <p:sp>
-          <p:nvSpPr>
-            <p:cNvPr id="195" name="TextBox 194">
-              <a:extLst>
-                <a:ext uri="{FF2B5EF4-FFF2-40B4-BE49-F238E27FC236}">
-                  <a16:creationId xmlns:a16="http://schemas.microsoft.com/office/drawing/2014/main" id="{7EB8F5E0-BFAF-F74F-8987-B44BE5C9D1F7}"/>
-                </a:ext>
-              </a:extLst>
-            </p:cNvPr>
-            <p:cNvSpPr txBox="1"/>
-            <p:nvPr/>
-          </p:nvSpPr>
-          <p:spPr>
-            <a:xfrm>
-              <a:off x="257134" y="3597657"/>
-              <a:ext cx="1260281" cy="246221"/>
-            </a:xfrm>
-            <a:prstGeom prst="rect">
-              <a:avLst/>
-            </a:prstGeom>
-            <a:noFill/>
-          </p:spPr>
-          <p:txBody>
-            <a:bodyPr wrap="none" rtlCol="0">
-              <a:spAutoFit/>
-            </a:bodyPr>
-            <a:lstStyle/>
-            <a:p>
-              <a:pPr algn="ctr">
-                <a:buClr>
-                  <a:srgbClr val="000000"/>
-                </a:buClr>
-                <a:buFont typeface="Arial"/>
-                <a:buNone/>
-              </a:pPr>
-              <a:r>
-                <a:rPr lang="en-US" sz="1000" kern="0" dirty="0">
-                  <a:solidFill>
-                    <a:srgbClr val="DA8F6E"/>
-                  </a:solidFill>
-                  <a:latin typeface="Arial"/>
-                  <a:cs typeface="Arial"/>
-                  <a:sym typeface="Arial"/>
-                </a:rPr>
-                <a:t>Phase 1 couplings </a:t>
-              </a:r>
-            </a:p>
-          </p:txBody>
-        </p:sp>
-        <p:cxnSp>
-          <p:nvCxnSpPr>
-            <p:cNvPr id="196" name="Straight Arrow Connector 195">
-              <a:extLst>
-                <a:ext uri="{FF2B5EF4-FFF2-40B4-BE49-F238E27FC236}">
-                  <a16:creationId xmlns:a16="http://schemas.microsoft.com/office/drawing/2014/main" id="{97BDA7EB-329B-4444-B4BE-C3AD86B96873}"/>
-                </a:ext>
-              </a:extLst>
-            </p:cNvPr>
-            <p:cNvCxnSpPr>
-              <a:cxnSpLocks/>
-            </p:cNvCxnSpPr>
-            <p:nvPr/>
-          </p:nvCxnSpPr>
-          <p:spPr>
-            <a:xfrm>
-              <a:off x="427230" y="3884136"/>
-              <a:ext cx="833745" cy="0"/>
-            </a:xfrm>
-            <a:prstGeom prst="straightConnector1">
-              <a:avLst/>
-            </a:prstGeom>
-            <a:noFill/>
-            <a:ln w="28575" cap="flat" cmpd="sng" algn="ctr">
-              <a:solidFill>
-                <a:srgbClr val="DA8F6E"/>
-              </a:solidFill>
-              <a:prstDash val="solid"/>
-              <a:miter lim="800000"/>
-              <a:tailEnd type="triangle" w="lg" len="lg"/>
-            </a:ln>
-            <a:effectLst/>
-          </p:spPr>
-        </p:cxnSp>
-      </p:grpSp>
-      <p:grpSp>
-        <p:nvGrpSpPr>
-          <p:cNvPr id="201" name="Group 200">
-            <a:extLst>
-              <a:ext uri="{FF2B5EF4-FFF2-40B4-BE49-F238E27FC236}">
-                <a16:creationId xmlns:a16="http://schemas.microsoft.com/office/drawing/2014/main" id="{69A204E1-6539-AB43-9FA3-4E01862A3250}"/>
-              </a:ext>
-            </a:extLst>
-          </p:cNvPr>
-          <p:cNvGrpSpPr/>
-          <p:nvPr/>
-        </p:nvGrpSpPr>
-        <p:grpSpPr>
-          <a:xfrm>
-            <a:off x="69539" y="5473928"/>
-            <a:ext cx="1260281" cy="277335"/>
-            <a:chOff x="257134" y="3606801"/>
-            <a:chExt cx="1260281" cy="277335"/>
-          </a:xfrm>
-        </p:grpSpPr>
-        <p:sp>
-          <p:nvSpPr>
-            <p:cNvPr id="203" name="TextBox 202">
-              <a:extLst>
-                <a:ext uri="{FF2B5EF4-FFF2-40B4-BE49-F238E27FC236}">
-                  <a16:creationId xmlns:a16="http://schemas.microsoft.com/office/drawing/2014/main" id="{777C1B20-7A8B-3B43-9896-A5BEAC01CBA9}"/>
-                </a:ext>
-              </a:extLst>
-            </p:cNvPr>
-            <p:cNvSpPr txBox="1"/>
-            <p:nvPr/>
-          </p:nvSpPr>
-          <p:spPr>
-            <a:xfrm>
-              <a:off x="257134" y="3606801"/>
-              <a:ext cx="1260281" cy="246221"/>
-            </a:xfrm>
-            <a:prstGeom prst="rect">
-              <a:avLst/>
-            </a:prstGeom>
-            <a:noFill/>
-          </p:spPr>
-          <p:txBody>
-            <a:bodyPr wrap="none" rtlCol="0">
-              <a:spAutoFit/>
-            </a:bodyPr>
-            <a:lstStyle/>
-            <a:p>
-              <a:pPr algn="ctr">
-                <a:buClr>
-                  <a:srgbClr val="000000"/>
-                </a:buClr>
-                <a:buFont typeface="Arial"/>
-                <a:buNone/>
-              </a:pPr>
-              <a:r>
-                <a:rPr lang="en-US" sz="1000" kern="0" dirty="0">
-                  <a:solidFill>
-                    <a:srgbClr val="00B050"/>
-                  </a:solidFill>
-                  <a:latin typeface="Arial"/>
-                  <a:cs typeface="Arial"/>
-                  <a:sym typeface="Arial"/>
-                </a:rPr>
-                <a:t>Phase 2 couplings </a:t>
-              </a:r>
-            </a:p>
-          </p:txBody>
-        </p:sp>
-        <p:cxnSp>
-          <p:nvCxnSpPr>
-            <p:cNvPr id="204" name="Straight Arrow Connector 203">
-              <a:extLst>
-                <a:ext uri="{FF2B5EF4-FFF2-40B4-BE49-F238E27FC236}">
-                  <a16:creationId xmlns:a16="http://schemas.microsoft.com/office/drawing/2014/main" id="{6CCA6508-87D9-8B4D-930D-E1A1CDDB9EDE}"/>
-                </a:ext>
-              </a:extLst>
-            </p:cNvPr>
-            <p:cNvCxnSpPr>
-              <a:cxnSpLocks/>
-            </p:cNvCxnSpPr>
-            <p:nvPr/>
-          </p:nvCxnSpPr>
-          <p:spPr>
-            <a:xfrm>
-              <a:off x="427230" y="3884136"/>
-              <a:ext cx="833745" cy="0"/>
-            </a:xfrm>
-            <a:prstGeom prst="straightConnector1">
-              <a:avLst/>
-            </a:prstGeom>
-            <a:noFill/>
-            <a:ln w="28575" cap="flat" cmpd="sng" algn="ctr">
-              <a:solidFill>
-                <a:srgbClr val="00B050"/>
-              </a:solidFill>
-              <a:prstDash val="solid"/>
-              <a:miter lim="800000"/>
-              <a:tailEnd type="triangle" w="lg" len="lg"/>
-            </a:ln>
-            <a:effectLst/>
-          </p:spPr>
-        </p:cxnSp>
-      </p:grpSp>
-      <p:sp>
-        <p:nvSpPr>
-          <p:cNvPr id="206" name="Rounded Rectangle 205">
-            <a:extLst>
-              <a:ext uri="{FF2B5EF4-FFF2-40B4-BE49-F238E27FC236}">
-                <a16:creationId xmlns:a16="http://schemas.microsoft.com/office/drawing/2014/main" id="{2649FDA2-4F8C-D945-B853-CF0E3754B8A7}"/>
-              </a:ext>
-            </a:extLst>
-          </p:cNvPr>
-          <p:cNvSpPr/>
-          <p:nvPr/>
-        </p:nvSpPr>
-        <p:spPr>
-          <a:xfrm>
-            <a:off x="113834" y="3744638"/>
-            <a:ext cx="1188720" cy="755612"/>
-          </a:xfrm>
-          <a:prstGeom prst="roundRect">
-            <a:avLst/>
-          </a:prstGeom>
-          <a:solidFill>
-            <a:srgbClr val="A44F2A">
-              <a:lumMod val="60000"/>
-              <a:lumOff val="40000"/>
-            </a:srgbClr>
-          </a:solidFill>
-          <a:ln w="28575" cap="flat" cmpd="sng" algn="ctr">
-            <a:solidFill>
-              <a:srgbClr val="00B050"/>
-            </a:solidFill>
-            <a:prstDash val="solid"/>
-            <a:miter lim="800000"/>
-          </a:ln>
-          <a:effectLst/>
-        </p:spPr>
-        <p:txBody>
-          <a:bodyPr rtlCol="0" anchor="ctr"/>
-          <a:lstStyle/>
-          <a:p>
-            <a:pPr marL="0" marR="0" lvl="0" indent="0" algn="ctr" defTabSz="914400" eaLnBrk="1" fontAlgn="auto" latinLnBrk="0" hangingPunct="1">
-              <a:lnSpc>
-                <a:spcPct val="100000"/>
-              </a:lnSpc>
-              <a:spcBef>
-                <a:spcPts val="0"/>
-              </a:spcBef>
-              <a:spcAft>
-                <a:spcPts val="0"/>
-              </a:spcAft>
-              <a:buClr>
-                <a:srgbClr val="000000"/>
-              </a:buClr>
-              <a:buSzTx/>
-              <a:buFont typeface="Arial"/>
-              <a:buNone/>
-              <a:tabLst/>
-              <a:defRPr/>
-            </a:pPr>
-            <a:r>
-              <a:rPr kumimoji="0" lang="en-US" sz="1200" b="0" i="0" u="none" strike="noStrike" kern="0" cap="none" spc="0" normalizeH="0" baseline="0" noProof="0" dirty="0">
-                <a:ln>
-                  <a:noFill/>
-                </a:ln>
-                <a:solidFill>
-                  <a:srgbClr val="FFFFFF"/>
-                </a:solidFill>
-                <a:effectLst/>
-                <a:uLnTx/>
-                <a:uFillTx/>
-                <a:latin typeface="Calibri" panose="020F0502020204030204"/>
-                <a:ea typeface="+mn-ea"/>
-                <a:cs typeface="+mn-cs"/>
-                <a:sym typeface="Arial"/>
-              </a:rPr>
-              <a:t>Phase 1 Capability Enhanced in Phase 2</a:t>
-            </a:r>
-            <a:endParaRPr kumimoji="0" lang="en-US" sz="1100" b="0" i="0" u="none" strike="noStrike" kern="0" cap="none" spc="0" normalizeH="0" baseline="0" noProof="0" dirty="0">
-              <a:ln>
-                <a:noFill/>
-              </a:ln>
-              <a:solidFill>
-                <a:srgbClr val="FFFFFF"/>
-              </a:solidFill>
-              <a:effectLst/>
-              <a:uLnTx/>
-              <a:uFillTx/>
-              <a:latin typeface="Calibri" panose="020F0502020204030204"/>
-              <a:ea typeface="+mn-ea"/>
-              <a:cs typeface="+mn-cs"/>
-              <a:sym typeface="Arial"/>
-            </a:endParaRPr>
-          </a:p>
-        </p:txBody>
-      </p:sp>
       <p:sp>
         <p:nvSpPr>
           <p:cNvPr id="79" name="TextBox 78">
@@ -5632,7 +5350,11 @@
           <a:lstStyle/>
           <a:p>
             <a:r>
-              <a:rPr lang="en-US" sz="1400" dirty="0"/>
+              <a:rPr lang="en-US" sz="1400" b="1" dirty="0">
+                <a:solidFill>
+                  <a:schemeClr val="accent2"/>
+                </a:solidFill>
+              </a:rPr>
               <a:t>Power plant locations</a:t>
             </a:r>
           </a:p>
@@ -5667,7 +5389,11 @@
           <a:lstStyle/>
           <a:p>
             <a:r>
-              <a:rPr lang="en-US" sz="1400" dirty="0"/>
+              <a:rPr lang="en-US" sz="1400" b="1" dirty="0">
+                <a:solidFill>
+                  <a:schemeClr val="accent2"/>
+                </a:solidFill>
+              </a:rPr>
               <a:t>Hourly electricity loads by Balancing Authority</a:t>
             </a:r>
           </a:p>
@@ -5687,8 +5413,8 @@
         </p:nvSpPr>
         <p:spPr>
           <a:xfrm>
-            <a:off x="6816462" y="5445851"/>
-            <a:ext cx="1902690" cy="523220"/>
+            <a:off x="6809665" y="5437384"/>
+            <a:ext cx="1977223" cy="523220"/>
           </a:xfrm>
           <a:prstGeom prst="rect">
             <a:avLst/>
@@ -5703,7 +5429,11 @@
           <a:p>
             <a:pPr algn="ctr"/>
             <a:r>
-              <a:rPr lang="en-US" sz="1400" dirty="0"/>
+              <a:rPr lang="en-US" sz="1400" b="1" dirty="0">
+                <a:solidFill>
+                  <a:schemeClr val="accent2"/>
+                </a:solidFill>
+              </a:rPr>
               <a:t>State-level annual electricity consumption</a:t>
             </a:r>
           </a:p>
@@ -5739,7 +5469,11 @@
           <a:p>
             <a:pPr algn="ctr"/>
             <a:r>
-              <a:rPr lang="en-US" sz="1400" dirty="0"/>
+              <a:rPr lang="en-US" sz="1400" b="1" dirty="0">
+                <a:solidFill>
+                  <a:schemeClr val="accent2"/>
+                </a:solidFill>
+              </a:rPr>
               <a:t>State-level electricity system expansion</a:t>
             </a:r>
           </a:p>
@@ -5759,8 +5493,8 @@
         </p:nvSpPr>
         <p:spPr>
           <a:xfrm>
-            <a:off x="4587929" y="3669373"/>
-            <a:ext cx="1160360" cy="1169551"/>
+            <a:off x="4394798" y="3484742"/>
+            <a:ext cx="1293609" cy="1169551"/>
           </a:xfrm>
           <a:prstGeom prst="rect">
             <a:avLst/>
@@ -5775,7 +5509,11 @@
           <a:p>
             <a:pPr algn="r"/>
             <a:r>
-              <a:rPr lang="en-US" sz="1400" dirty="0"/>
+              <a:rPr lang="en-US" sz="1400" b="1" dirty="0">
+                <a:solidFill>
+                  <a:schemeClr val="accent2"/>
+                </a:solidFill>
+              </a:rPr>
               <a:t> Temperature and precipitation by state and basin</a:t>
             </a:r>
           </a:p>
@@ -5795,7 +5533,7 @@
         </p:nvSpPr>
         <p:spPr>
           <a:xfrm>
-            <a:off x="5401646" y="738382"/>
+            <a:off x="5562514" y="704514"/>
             <a:ext cx="6051126" cy="307777"/>
           </a:xfrm>
           <a:prstGeom prst="rect">
@@ -5810,7 +5548,11 @@
           <a:lstStyle/>
           <a:p>
             <a:r>
-              <a:rPr lang="en-US" sz="1400" dirty="0"/>
+              <a:rPr lang="en-US" sz="1400" b="1" dirty="0">
+                <a:solidFill>
+                  <a:schemeClr val="accent2"/>
+                </a:solidFill>
+              </a:rPr>
               <a:t>Hourly weather variables needed to derate thermoelectric power plants</a:t>
             </a:r>
           </a:p>
@@ -5830,7 +5572,7 @@
         </p:nvSpPr>
         <p:spPr>
           <a:xfrm>
-            <a:off x="7085965" y="4338643"/>
+            <a:off x="7102899" y="4364044"/>
             <a:ext cx="1254197" cy="738664"/>
           </a:xfrm>
           <a:prstGeom prst="rect">
@@ -5846,14 +5588,22 @@
           <a:p>
             <a:pPr algn="r"/>
             <a:r>
-              <a:rPr lang="en-US" sz="1400" dirty="0"/>
+              <a:rPr lang="en-US" sz="1400" b="1" dirty="0">
+                <a:solidFill>
+                  <a:schemeClr val="accent2"/>
+                </a:solidFill>
+              </a:rPr>
               <a:t>Fuel prices and generator </a:t>
             </a:r>
           </a:p>
           <a:p>
             <a:pPr algn="r"/>
             <a:r>
-              <a:rPr lang="en-US" sz="1400" dirty="0"/>
+              <a:rPr lang="en-US" sz="1400" b="1" dirty="0">
+                <a:solidFill>
+                  <a:schemeClr val="accent2"/>
+                </a:solidFill>
+              </a:rPr>
               <a:t>variable costs</a:t>
             </a:r>
           </a:p>
@@ -5884,9 +5634,9 @@
             </a:avLst>
           </a:prstGeom>
           <a:noFill/>
-          <a:ln w="28575" cap="flat" cmpd="sng" algn="ctr">
+          <a:ln w="25400" cap="flat" cmpd="sng" algn="ctr">
             <a:solidFill>
-              <a:srgbClr val="00B050"/>
+              <a:schemeClr val="tx1"/>
             </a:solidFill>
             <a:prstDash val="sysDot"/>
             <a:miter lim="800000"/>
@@ -5910,7 +5660,7 @@
         </p:nvSpPr>
         <p:spPr>
           <a:xfrm>
-            <a:off x="9984426" y="2998553"/>
+            <a:off x="9975959" y="3007020"/>
             <a:ext cx="959687" cy="738664"/>
           </a:xfrm>
           <a:prstGeom prst="rect">
@@ -5926,7 +5676,11 @@
           <a:p>
             <a:pPr algn="r"/>
             <a:r>
-              <a:rPr lang="en-US" sz="1400" dirty="0"/>
+              <a:rPr lang="en-US" sz="1400" b="1" dirty="0">
+                <a:solidFill>
+                  <a:schemeClr val="accent2"/>
+                </a:solidFill>
+              </a:rPr>
               <a:t>Locational marginal prices</a:t>
             </a:r>
           </a:p>
@@ -6032,10 +5786,14 @@
             <a:avLst/>
           </a:prstGeom>
           <a:solidFill>
-            <a:srgbClr val="00B050"/>
+            <a:schemeClr val="bg1">
+              <a:lumMod val="50000"/>
+            </a:schemeClr>
           </a:solidFill>
-          <a:ln w="12700" cap="flat" cmpd="sng" algn="ctr">
-            <a:noFill/>
+          <a:ln w="25400" cap="flat" cmpd="sng" algn="ctr">
+            <a:solidFill>
+              <a:schemeClr val="tx1"/>
+            </a:solidFill>
             <a:prstDash val="solid"/>
             <a:miter lim="800000"/>
           </a:ln>
@@ -6110,9 +5868,9 @@
             <a:avLst/>
           </a:prstGeom>
           <a:noFill/>
-          <a:ln w="28575" cap="flat" cmpd="sng" algn="ctr">
+          <a:ln w="25400" cap="flat" cmpd="sng" algn="ctr">
             <a:solidFill>
-              <a:srgbClr val="DA8F6E"/>
+              <a:schemeClr val="tx1"/>
             </a:solidFill>
             <a:prstDash val="solid"/>
             <a:miter lim="800000"/>
@@ -6140,15 +5898,15 @@
         <p:spPr>
           <a:xfrm>
             <a:off x="4963400" y="1214999"/>
-            <a:ext cx="794428" cy="454353"/>
+            <a:ext cx="71371" cy="623687"/>
           </a:xfrm>
           <a:prstGeom prst="bentConnector2">
             <a:avLst/>
           </a:prstGeom>
           <a:noFill/>
-          <a:ln w="28575" cap="flat" cmpd="sng" algn="ctr">
+          <a:ln w="25400" cap="flat" cmpd="sng" algn="ctr">
             <a:solidFill>
-              <a:srgbClr val="00B050"/>
+              <a:schemeClr val="tx1"/>
             </a:solidFill>
             <a:prstDash val="dash"/>
             <a:miter lim="800000"/>
@@ -6182,11 +5940,9 @@
             <a:avLst/>
           </a:prstGeom>
           <a:noFill/>
-          <a:ln w="28575" cap="flat" cmpd="sng" algn="ctr">
+          <a:ln w="25400" cap="flat" cmpd="sng" algn="ctr">
             <a:solidFill>
-              <a:schemeClr val="bg1">
-                <a:lumMod val="50000"/>
-              </a:schemeClr>
+              <a:schemeClr val="tx1"/>
             </a:solidFill>
             <a:prstDash val="solid"/>
             <a:miter lim="800000"/>
@@ -6225,7 +5981,11 @@
           <a:p>
             <a:pPr algn="r"/>
             <a:r>
-              <a:rPr lang="en-US" sz="1400" dirty="0"/>
+              <a:rPr lang="en-US" sz="1400" b="1" dirty="0">
+                <a:solidFill>
+                  <a:schemeClr val="accent2"/>
+                </a:solidFill>
+              </a:rPr>
               <a:t>Hourly weather variables</a:t>
             </a:r>
           </a:p>
@@ -6259,9 +6019,9 @@
             </a:avLst>
           </a:prstGeom>
           <a:noFill/>
-          <a:ln w="28575" cap="flat" cmpd="sng" algn="ctr">
+          <a:ln w="25400" cap="flat" cmpd="sng" algn="ctr">
             <a:solidFill>
-              <a:srgbClr val="00B050"/>
+              <a:schemeClr val="tx1"/>
             </a:solidFill>
             <a:prstDash val="dash"/>
             <a:miter lim="800000"/>
@@ -6270,285 +6030,6 @@
           <a:effectLst/>
         </p:spPr>
       </p:cxnSp>
-      <p:grpSp>
-        <p:nvGrpSpPr>
-          <p:cNvPr id="11" name="Group 10">
-            <a:extLst>
-              <a:ext uri="{FF2B5EF4-FFF2-40B4-BE49-F238E27FC236}">
-                <a16:creationId xmlns:a16="http://schemas.microsoft.com/office/drawing/2014/main" id="{9C52BBD8-1A23-014D-A601-48DA43FB3C4C}"/>
-              </a:ext>
-            </a:extLst>
-          </p:cNvPr>
-          <p:cNvGrpSpPr/>
-          <p:nvPr/>
-        </p:nvGrpSpPr>
-        <p:grpSpPr>
-          <a:xfrm>
-            <a:off x="98056" y="5896101"/>
-            <a:ext cx="1330005" cy="633564"/>
-            <a:chOff x="293992" y="6102043"/>
-            <a:chExt cx="1330005" cy="633564"/>
-          </a:xfrm>
-        </p:grpSpPr>
-        <p:cxnSp>
-          <p:nvCxnSpPr>
-            <p:cNvPr id="71" name="Straight Arrow Connector 70">
-              <a:extLst>
-                <a:ext uri="{FF2B5EF4-FFF2-40B4-BE49-F238E27FC236}">
-                  <a16:creationId xmlns:a16="http://schemas.microsoft.com/office/drawing/2014/main" id="{3848818D-6426-6941-B7C5-B1B59CFCBC19}"/>
-                </a:ext>
-              </a:extLst>
-            </p:cNvPr>
-            <p:cNvCxnSpPr>
-              <a:cxnSpLocks/>
-            </p:cNvCxnSpPr>
-            <p:nvPr/>
-          </p:nvCxnSpPr>
-          <p:spPr>
-            <a:xfrm>
-              <a:off x="293992" y="6225153"/>
-              <a:ext cx="548640" cy="0"/>
-            </a:xfrm>
-            <a:prstGeom prst="straightConnector1">
-              <a:avLst/>
-            </a:prstGeom>
-            <a:noFill/>
-            <a:ln w="28575" cap="flat" cmpd="sng" algn="ctr">
-              <a:solidFill>
-                <a:schemeClr val="tx1"/>
-              </a:solidFill>
-              <a:prstDash val="solid"/>
-              <a:miter lim="800000"/>
-              <a:tailEnd type="triangle" w="lg" len="lg"/>
-            </a:ln>
-            <a:effectLst/>
-          </p:spPr>
-        </p:cxnSp>
-        <p:sp>
-          <p:nvSpPr>
-            <p:cNvPr id="6" name="TextBox 5">
-              <a:extLst>
-                <a:ext uri="{FF2B5EF4-FFF2-40B4-BE49-F238E27FC236}">
-                  <a16:creationId xmlns:a16="http://schemas.microsoft.com/office/drawing/2014/main" id="{741A565B-90ED-B648-8687-E708FBAEAEAC}"/>
-                </a:ext>
-              </a:extLst>
-            </p:cNvPr>
-            <p:cNvSpPr txBox="1"/>
-            <p:nvPr/>
-          </p:nvSpPr>
-          <p:spPr>
-            <a:xfrm>
-              <a:off x="805562" y="6102043"/>
-              <a:ext cx="818435" cy="246221"/>
-            </a:xfrm>
-            <a:prstGeom prst="rect">
-              <a:avLst/>
-            </a:prstGeom>
-            <a:noFill/>
-          </p:spPr>
-          <p:txBody>
-            <a:bodyPr wrap="square" rtlCol="0">
-              <a:spAutoFit/>
-            </a:bodyPr>
-            <a:lstStyle/>
-            <a:p>
-              <a:r>
-                <a:rPr lang="en-US" sz="1000" dirty="0">
-                  <a:latin typeface="Arial" panose="020B0604020202020204" pitchFamily="34" charset="0"/>
-                  <a:cs typeface="Arial" panose="020B0604020202020204" pitchFamily="34" charset="0"/>
-                </a:rPr>
-                <a:t>Completed</a:t>
-              </a:r>
-            </a:p>
-          </p:txBody>
-        </p:sp>
-        <p:cxnSp>
-          <p:nvCxnSpPr>
-            <p:cNvPr id="72" name="Straight Arrow Connector 71">
-              <a:extLst>
-                <a:ext uri="{FF2B5EF4-FFF2-40B4-BE49-F238E27FC236}">
-                  <a16:creationId xmlns:a16="http://schemas.microsoft.com/office/drawing/2014/main" id="{7B7C24A9-5999-2F4E-B4ED-06F39EE1C0FC}"/>
-                </a:ext>
-              </a:extLst>
-            </p:cNvPr>
-            <p:cNvCxnSpPr>
-              <a:cxnSpLocks/>
-            </p:cNvCxnSpPr>
-            <p:nvPr/>
-          </p:nvCxnSpPr>
-          <p:spPr>
-            <a:xfrm>
-              <a:off x="293992" y="6417151"/>
-              <a:ext cx="548640" cy="0"/>
-            </a:xfrm>
-            <a:prstGeom prst="straightConnector1">
-              <a:avLst/>
-            </a:prstGeom>
-            <a:noFill/>
-            <a:ln w="28575" cap="flat" cmpd="sng" algn="ctr">
-              <a:solidFill>
-                <a:schemeClr val="tx1"/>
-              </a:solidFill>
-              <a:prstDash val="dash"/>
-              <a:miter lim="800000"/>
-              <a:tailEnd type="triangle" w="lg" len="lg"/>
-            </a:ln>
-            <a:effectLst/>
-          </p:spPr>
-        </p:cxnSp>
-        <p:sp>
-          <p:nvSpPr>
-            <p:cNvPr id="74" name="TextBox 73">
-              <a:extLst>
-                <a:ext uri="{FF2B5EF4-FFF2-40B4-BE49-F238E27FC236}">
-                  <a16:creationId xmlns:a16="http://schemas.microsoft.com/office/drawing/2014/main" id="{22B61D55-0E71-D649-AAEA-6AE9B632C137}"/>
-                </a:ext>
-              </a:extLst>
-            </p:cNvPr>
-            <p:cNvSpPr txBox="1"/>
-            <p:nvPr/>
-          </p:nvSpPr>
-          <p:spPr>
-            <a:xfrm>
-              <a:off x="805563" y="6294041"/>
-              <a:ext cx="741412" cy="246221"/>
-            </a:xfrm>
-            <a:prstGeom prst="rect">
-              <a:avLst/>
-            </a:prstGeom>
-            <a:noFill/>
-          </p:spPr>
-          <p:txBody>
-            <a:bodyPr wrap="square" rtlCol="0">
-              <a:spAutoFit/>
-            </a:bodyPr>
-            <a:lstStyle/>
-            <a:p>
-              <a:r>
-                <a:rPr lang="en-US" sz="1000" dirty="0">
-                  <a:latin typeface="Arial" panose="020B0604020202020204" pitchFamily="34" charset="0"/>
-                  <a:cs typeface="Arial" panose="020B0604020202020204" pitchFamily="34" charset="0"/>
-                </a:rPr>
-                <a:t>Tested</a:t>
-              </a:r>
-            </a:p>
-          </p:txBody>
-        </p:sp>
-        <p:cxnSp>
-          <p:nvCxnSpPr>
-            <p:cNvPr id="73" name="Straight Arrow Connector 72">
-              <a:extLst>
-                <a:ext uri="{FF2B5EF4-FFF2-40B4-BE49-F238E27FC236}">
-                  <a16:creationId xmlns:a16="http://schemas.microsoft.com/office/drawing/2014/main" id="{304CB50A-1E82-A941-B734-3708FEBA8BBA}"/>
-                </a:ext>
-              </a:extLst>
-            </p:cNvPr>
-            <p:cNvCxnSpPr>
-              <a:cxnSpLocks/>
-            </p:cNvCxnSpPr>
-            <p:nvPr/>
-          </p:nvCxnSpPr>
-          <p:spPr>
-            <a:xfrm>
-              <a:off x="293992" y="6612496"/>
-              <a:ext cx="548640" cy="0"/>
-            </a:xfrm>
-            <a:prstGeom prst="straightConnector1">
-              <a:avLst/>
-            </a:prstGeom>
-            <a:noFill/>
-            <a:ln w="28575" cap="flat" cmpd="sng" algn="ctr">
-              <a:solidFill>
-                <a:schemeClr val="tx1"/>
-              </a:solidFill>
-              <a:prstDash val="sysDot"/>
-              <a:miter lim="800000"/>
-              <a:tailEnd type="triangle" w="lg" len="lg"/>
-            </a:ln>
-            <a:effectLst/>
-          </p:spPr>
-        </p:cxnSp>
-        <p:sp>
-          <p:nvSpPr>
-            <p:cNvPr id="75" name="TextBox 74">
-              <a:extLst>
-                <a:ext uri="{FF2B5EF4-FFF2-40B4-BE49-F238E27FC236}">
-                  <a16:creationId xmlns:a16="http://schemas.microsoft.com/office/drawing/2014/main" id="{61F1AFC1-666C-284A-94A7-8CDC2A4EFA17}"/>
-                </a:ext>
-              </a:extLst>
-            </p:cNvPr>
-            <p:cNvSpPr txBox="1"/>
-            <p:nvPr/>
-          </p:nvSpPr>
-          <p:spPr>
-            <a:xfrm>
-              <a:off x="805563" y="6489386"/>
-              <a:ext cx="741412" cy="246221"/>
-            </a:xfrm>
-            <a:prstGeom prst="rect">
-              <a:avLst/>
-            </a:prstGeom>
-            <a:noFill/>
-          </p:spPr>
-          <p:txBody>
-            <a:bodyPr wrap="square" rtlCol="0">
-              <a:spAutoFit/>
-            </a:bodyPr>
-            <a:lstStyle/>
-            <a:p>
-              <a:r>
-                <a:rPr lang="en-US" sz="1000" dirty="0">
-                  <a:latin typeface="Arial" panose="020B0604020202020204" pitchFamily="34" charset="0"/>
-                  <a:cs typeface="Arial" panose="020B0604020202020204" pitchFamily="34" charset="0"/>
-                </a:rPr>
-                <a:t>Planned</a:t>
-              </a:r>
-            </a:p>
-          </p:txBody>
-        </p:sp>
-      </p:grpSp>
-      <p:sp>
-        <p:nvSpPr>
-          <p:cNvPr id="13" name="TextBox 12">
-            <a:extLst>
-              <a:ext uri="{FF2B5EF4-FFF2-40B4-BE49-F238E27FC236}">
-                <a16:creationId xmlns:a16="http://schemas.microsoft.com/office/drawing/2014/main" id="{8F2808AF-5952-8843-AF70-52BA5B85ABA7}"/>
-              </a:ext>
-            </a:extLst>
-          </p:cNvPr>
-          <p:cNvSpPr txBox="1"/>
-          <p:nvPr/>
-        </p:nvSpPr>
-        <p:spPr>
-          <a:xfrm>
-            <a:off x="-29348" y="6548739"/>
-            <a:ext cx="1475084" cy="253916"/>
-          </a:xfrm>
-          <a:prstGeom prst="rect">
-            <a:avLst/>
-          </a:prstGeom>
-          <a:noFill/>
-        </p:spPr>
-        <p:txBody>
-          <a:bodyPr wrap="square" rtlCol="0">
-            <a:spAutoFit/>
-          </a:bodyPr>
-          <a:lstStyle/>
-          <a:p>
-            <a:pPr algn="ctr"/>
-            <a:r>
-              <a:rPr lang="en-US" sz="1000" b="1" dirty="0">
-                <a:solidFill>
-                  <a:srgbClr val="7030A0"/>
-                </a:solidFill>
-                <a:latin typeface="Arial" panose="020B0604020202020204" pitchFamily="34" charset="0"/>
-                <a:cs typeface="Arial" panose="020B0604020202020204" pitchFamily="34" charset="0"/>
-              </a:rPr>
-              <a:t>Scale (Resolution)</a:t>
-            </a:r>
-          </a:p>
-        </p:txBody>
-      </p:sp>
       <p:sp>
         <p:nvSpPr>
           <p:cNvPr id="18" name="Rounded Rectangle 17">
@@ -6570,14 +6051,13 @@
             <a:avLst/>
           </a:prstGeom>
           <a:solidFill>
-            <a:srgbClr val="A44F2A">
-              <a:lumMod val="60000"/>
-              <a:lumOff val="40000"/>
-            </a:srgbClr>
+            <a:schemeClr val="bg1">
+              <a:lumMod val="50000"/>
+            </a:schemeClr>
           </a:solidFill>
-          <a:ln w="28575" cap="flat" cmpd="sng" algn="ctr">
+          <a:ln w="25400" cap="flat" cmpd="sng" algn="ctr">
             <a:solidFill>
-              <a:srgbClr val="00B050"/>
+              <a:schemeClr val="tx1"/>
             </a:solidFill>
             <a:prstDash val="solid"/>
             <a:miter lim="800000"/>
@@ -6597,7 +6077,7 @@
             <a:r>
               <a:rPr lang="en-US" sz="1400" kern="0" dirty="0">
                 <a:solidFill>
-                  <a:srgbClr val="FFFFFF"/>
+                  <a:schemeClr val="bg1"/>
                 </a:solidFill>
                 <a:sym typeface="Arial"/>
               </a:rPr>
@@ -6614,7 +6094,7 @@
             <a:r>
               <a:rPr lang="en-US" sz="1400" kern="0" dirty="0">
                 <a:solidFill>
-                  <a:srgbClr val="FFFFFF"/>
+                  <a:schemeClr val="bg1"/>
                 </a:solidFill>
                 <a:sym typeface="Arial"/>
               </a:rPr>
@@ -6653,7 +6133,11 @@
           <a:p>
             <a:pPr algn="r"/>
             <a:r>
-              <a:rPr lang="en-US" sz="1400" dirty="0"/>
+              <a:rPr lang="en-US" sz="1400" b="1" dirty="0">
+                <a:solidFill>
+                  <a:schemeClr val="accent2"/>
+                </a:solidFill>
+              </a:rPr>
               <a:t>County populations</a:t>
             </a:r>
           </a:p>
@@ -6673,19 +6157,21 @@
         </p:nvSpPr>
         <p:spPr>
           <a:xfrm>
-            <a:off x="5026308" y="1669352"/>
-            <a:ext cx="1463040" cy="744200"/>
+            <a:off x="4577571" y="1838686"/>
+            <a:ext cx="914400" cy="744200"/>
           </a:xfrm>
           <a:prstGeom prst="roundRect">
             <a:avLst/>
           </a:prstGeom>
           <a:solidFill>
-            <a:srgbClr val="FFFFFF">
+            <a:schemeClr val="bg1">
               <a:lumMod val="50000"/>
-            </a:srgbClr>
+            </a:schemeClr>
           </a:solidFill>
-          <a:ln w="12700" cap="flat" cmpd="sng" algn="ctr">
-            <a:noFill/>
+          <a:ln w="25400" cap="flat" cmpd="sng" algn="ctr">
+            <a:solidFill>
+              <a:schemeClr val="tx1"/>
+            </a:solidFill>
             <a:prstDash val="solid"/>
             <a:miter lim="800000"/>
           </a:ln>
@@ -6715,7 +6201,7 @@
               <a:defRPr/>
             </a:pPr>
             <a:r>
-              <a:rPr kumimoji="0" lang="en-US" sz="1400" b="0" i="0" u="none" strike="noStrike" kern="0" cap="none" spc="0" normalizeH="0" baseline="0" noProof="0" dirty="0">
+              <a:rPr kumimoji="0" lang="en-US" sz="1200" b="0" i="0" u="none" strike="noStrike" kern="0" cap="none" spc="0" normalizeH="0" baseline="0" noProof="0" dirty="0">
                 <a:ln>
                   <a:noFill/>
                 </a:ln>
@@ -6730,7 +6216,7 @@
                 <a:cs typeface="+mn-cs"/>
                 <a:sym typeface="Arial"/>
               </a:rPr>
-              <a:t>Water Runoff Emulator</a:t>
+              <a:t>Water Runoff</a:t>
             </a:r>
           </a:p>
           <a:p>
@@ -6754,7 +6240,7 @@
               <a:defRPr/>
             </a:pPr>
             <a:r>
-              <a:rPr kumimoji="0" lang="en-US" sz="1400" b="0" i="0" u="none" strike="noStrike" kern="0" cap="none" spc="0" normalizeH="0" baseline="0" noProof="0" dirty="0">
+              <a:rPr kumimoji="0" lang="en-US" sz="900" b="0" i="0" u="none" strike="noStrike" kern="0" cap="none" spc="0" normalizeH="0" baseline="0" noProof="0" dirty="0">
                 <a:ln>
                   <a:noFill/>
                 </a:ln>
@@ -6788,17 +6274,21 @@
         </p:nvSpPr>
         <p:spPr>
           <a:xfrm>
-            <a:off x="5026308" y="2813355"/>
-            <a:ext cx="1463040" cy="744200"/>
+            <a:off x="5539906" y="1838686"/>
+            <a:ext cx="914400" cy="744200"/>
           </a:xfrm>
           <a:prstGeom prst="roundRect">
             <a:avLst/>
           </a:prstGeom>
           <a:solidFill>
-            <a:srgbClr val="00B050"/>
+            <a:schemeClr val="bg1">
+              <a:lumMod val="50000"/>
+            </a:schemeClr>
           </a:solidFill>
-          <a:ln w="12700" cap="flat" cmpd="sng" algn="ctr">
-            <a:noFill/>
+          <a:ln w="25400" cap="flat" cmpd="sng" algn="ctr">
+            <a:solidFill>
+              <a:schemeClr val="tx1"/>
+            </a:solidFill>
             <a:prstDash val="solid"/>
             <a:miter lim="800000"/>
           </a:ln>
@@ -6828,7 +6318,7 @@
               <a:defRPr/>
             </a:pPr>
             <a:r>
-              <a:rPr kumimoji="0" lang="en-US" sz="1400" b="0" i="0" u="none" strike="noStrike" kern="0" cap="none" spc="0" normalizeH="0" baseline="0" noProof="0" dirty="0">
+              <a:rPr kumimoji="0" lang="en-US" sz="1200" b="0" i="0" u="none" strike="noStrike" kern="0" cap="none" spc="0" normalizeH="0" baseline="0" noProof="0" dirty="0">
                 <a:ln>
                   <a:noFill/>
                 </a:ln>
@@ -6843,7 +6333,7 @@
                 <a:cs typeface="+mn-cs"/>
                 <a:sym typeface="Arial"/>
               </a:rPr>
-              <a:t>Heating/Cooling Degree Days</a:t>
+              <a:t>HDH/CDH</a:t>
             </a:r>
           </a:p>
           <a:p>
@@ -6867,7 +6357,7 @@
               <a:defRPr/>
             </a:pPr>
             <a:r>
-              <a:rPr kumimoji="0" lang="en-US" sz="1400" b="0" i="0" u="none" strike="noStrike" kern="0" cap="none" spc="0" normalizeH="0" baseline="0" noProof="0" dirty="0">
+              <a:rPr kumimoji="0" lang="en-US" sz="900" b="0" i="0" u="none" strike="noStrike" kern="0" cap="none" spc="0" normalizeH="0" baseline="0" noProof="0" dirty="0">
                 <a:ln>
                   <a:noFill/>
                 </a:ln>
@@ -6887,34 +6377,181 @@
           </a:p>
         </p:txBody>
       </p:sp>
+      <p:sp>
+        <p:nvSpPr>
+          <p:cNvPr id="78" name="Rounded Rectangle 77">
+            <a:extLst>
+              <a:ext uri="{FF2B5EF4-FFF2-40B4-BE49-F238E27FC236}">
+                <a16:creationId xmlns:a16="http://schemas.microsoft.com/office/drawing/2014/main" id="{2213A539-FE75-2E49-97A2-21078ECCB86B}"/>
+              </a:ext>
+            </a:extLst>
+          </p:cNvPr>
+          <p:cNvSpPr/>
+          <p:nvPr/>
+        </p:nvSpPr>
+        <p:spPr>
+          <a:xfrm>
+            <a:off x="6502241" y="1838686"/>
+            <a:ext cx="914400" cy="744200"/>
+          </a:xfrm>
+          <a:prstGeom prst="roundRect">
+            <a:avLst/>
+          </a:prstGeom>
+          <a:solidFill>
+            <a:schemeClr val="bg1">
+              <a:lumMod val="50000"/>
+            </a:schemeClr>
+          </a:solidFill>
+          <a:ln w="25400" cap="flat" cmpd="sng" algn="ctr">
+            <a:solidFill>
+              <a:schemeClr val="tx1"/>
+            </a:solidFill>
+            <a:prstDash val="solid"/>
+            <a:miter lim="800000"/>
+          </a:ln>
+          <a:effectLst/>
+        </p:spPr>
+        <p:txBody>
+          <a:bodyPr rtlCol="0" anchor="ctr"/>
+          <a:lstStyle/>
+          <a:p>
+            <a:pPr marL="0" marR="0" lvl="0" indent="0" algn="ctr" defTabSz="914400" eaLnBrk="1" fontAlgn="auto" latinLnBrk="0" hangingPunct="1">
+              <a:lnSpc>
+                <a:spcPct val="100000"/>
+              </a:lnSpc>
+              <a:spcBef>
+                <a:spcPts val="0"/>
+              </a:spcBef>
+              <a:spcAft>
+                <a:spcPts val="0"/>
+              </a:spcAft>
+              <a:buClr>
+                <a:srgbClr val="000000"/>
+              </a:buClr>
+              <a:buSzTx/>
+              <a:buFont typeface="Arial"/>
+              <a:buNone/>
+              <a:tabLst/>
+              <a:defRPr/>
+            </a:pPr>
+            <a:r>
+              <a:rPr kumimoji="0" lang="en-US" sz="1200" b="0" i="0" u="none" strike="noStrike" kern="0" cap="none" spc="0" normalizeH="0" baseline="0" noProof="0" dirty="0">
+                <a:ln>
+                  <a:noFill/>
+                </a:ln>
+                <a:solidFill>
+                  <a:srgbClr val="FFFFFF"/>
+                </a:solidFill>
+                <a:effectLst/>
+                <a:uLnTx/>
+                <a:uFillTx/>
+                <a:latin typeface="Calibri" panose="020F0502020204030204"/>
+                <a:ea typeface="+mn-ea"/>
+                <a:cs typeface="+mn-cs"/>
+                <a:sym typeface="Arial"/>
+              </a:rPr>
+              <a:t>Ag Yield</a:t>
+            </a:r>
+          </a:p>
+          <a:p>
+            <a:pPr marL="0" marR="0" lvl="0" indent="0" algn="ctr" defTabSz="914400" eaLnBrk="1" fontAlgn="auto" latinLnBrk="0" hangingPunct="1">
+              <a:lnSpc>
+                <a:spcPct val="100000"/>
+              </a:lnSpc>
+              <a:spcBef>
+                <a:spcPts val="0"/>
+              </a:spcBef>
+              <a:spcAft>
+                <a:spcPts val="0"/>
+              </a:spcAft>
+              <a:buClr>
+                <a:srgbClr val="000000"/>
+              </a:buClr>
+              <a:buSzTx/>
+              <a:buFont typeface="Arial"/>
+              <a:buNone/>
+              <a:tabLst/>
+              <a:defRPr/>
+            </a:pPr>
+            <a:r>
+              <a:rPr lang="en-US" sz="900" kern="0" dirty="0">
+                <a:solidFill>
+                  <a:srgbClr val="FFFFFF"/>
+                </a:solidFill>
+                <a:latin typeface="Calibri" panose="020F0502020204030204"/>
+                <a:sym typeface="Arial"/>
+              </a:rPr>
+              <a:t>(Persephone)</a:t>
+            </a:r>
+          </a:p>
+        </p:txBody>
+      </p:sp>
       <p:cxnSp>
         <p:nvCxnSpPr>
-          <p:cNvPr id="80" name="Straight Arrow Connector 79">
-            <a:extLst>
-              <a:ext uri="{FF2B5EF4-FFF2-40B4-BE49-F238E27FC236}">
-                <a16:creationId xmlns:a16="http://schemas.microsoft.com/office/drawing/2014/main" id="{BEA5E7F8-407A-344D-8F97-6D535B899065}"/>
+          <p:cNvPr id="82" name="Straight Arrow Connector 129">
+            <a:extLst>
+              <a:ext uri="{FF2B5EF4-FFF2-40B4-BE49-F238E27FC236}">
+                <a16:creationId xmlns:a16="http://schemas.microsoft.com/office/drawing/2014/main" id="{E7393740-2167-1742-B862-37826BBA8F5F}"/>
               </a:ext>
             </a:extLst>
           </p:cNvPr>
           <p:cNvCxnSpPr>
             <a:cxnSpLocks/>
-            <a:stCxn id="76" idx="2"/>
+            <a:stCxn id="24" idx="0"/>
+            <a:endCxn id="54" idx="2"/>
+          </p:cNvCxnSpPr>
+          <p:nvPr/>
+        </p:nvCxnSpPr>
+        <p:spPr>
+          <a:xfrm rot="5400000" flipH="1" flipV="1">
+            <a:off x="6753993" y="2641631"/>
+            <a:ext cx="1819241" cy="3076440"/>
+          </a:xfrm>
+          <a:prstGeom prst="bentConnector3">
+            <a:avLst>
+              <a:gd name="adj1" fmla="val 65358"/>
+            </a:avLst>
+          </a:prstGeom>
+          <a:noFill/>
+          <a:ln w="25400" cap="flat" cmpd="sng" algn="ctr">
+            <a:solidFill>
+              <a:schemeClr val="tx1"/>
+            </a:solidFill>
+            <a:prstDash val="sysDot"/>
+            <a:miter lim="800000"/>
+            <a:tailEnd type="triangle" w="lg" len="lg"/>
+          </a:ln>
+          <a:effectLst/>
+        </p:spPr>
+      </p:cxnSp>
+      <p:cxnSp>
+        <p:nvCxnSpPr>
+          <p:cNvPr id="84" name="Elbow Connector 83">
+            <a:extLst>
+              <a:ext uri="{FF2B5EF4-FFF2-40B4-BE49-F238E27FC236}">
+                <a16:creationId xmlns:a16="http://schemas.microsoft.com/office/drawing/2014/main" id="{242EC4CD-2D81-6545-B429-1114C5D150B7}"/>
+              </a:ext>
+            </a:extLst>
+          </p:cNvPr>
+          <p:cNvCxnSpPr>
+            <a:cxnSpLocks/>
+            <a:stCxn id="70" idx="3"/>
             <a:endCxn id="77" idx="0"/>
           </p:cNvCxnSpPr>
           <p:nvPr/>
         </p:nvCxnSpPr>
         <p:spPr>
           <a:xfrm>
-            <a:off x="5757828" y="2413552"/>
-            <a:ext cx="0" cy="399803"/>
+            <a:off x="4963400" y="1214999"/>
+            <a:ext cx="1033706" cy="623687"/>
           </a:xfrm>
-          <a:prstGeom prst="straightConnector1">
+          <a:prstGeom prst="bentConnector2">
             <a:avLst/>
           </a:prstGeom>
           <a:noFill/>
-          <a:ln w="28575" cap="flat" cmpd="sng" algn="ctr">
+          <a:ln w="25400" cap="flat" cmpd="sng" algn="ctr">
             <a:solidFill>
-              <a:srgbClr val="00B050"/>
+              <a:schemeClr val="tx1"/>
             </a:solidFill>
             <a:prstDash val="dash"/>
             <a:miter lim="800000"/>
@@ -6925,31 +6562,32 @@
       </p:cxnSp>
       <p:cxnSp>
         <p:nvCxnSpPr>
-          <p:cNvPr id="81" name="Straight Arrow Connector 80">
-            <a:extLst>
-              <a:ext uri="{FF2B5EF4-FFF2-40B4-BE49-F238E27FC236}">
-                <a16:creationId xmlns:a16="http://schemas.microsoft.com/office/drawing/2014/main" id="{CEE1025D-359D-AC41-BDC4-C109A6A6C0D0}"/>
+          <p:cNvPr id="86" name="Elbow Connector 85">
+            <a:extLst>
+              <a:ext uri="{FF2B5EF4-FFF2-40B4-BE49-F238E27FC236}">
+                <a16:creationId xmlns:a16="http://schemas.microsoft.com/office/drawing/2014/main" id="{36938572-468B-C14F-931C-08F086B9DF09}"/>
               </a:ext>
             </a:extLst>
           </p:cNvPr>
           <p:cNvCxnSpPr>
             <a:cxnSpLocks/>
-            <a:stCxn id="77" idx="2"/>
+            <a:stCxn id="70" idx="3"/>
+            <a:endCxn id="78" idx="0"/>
           </p:cNvCxnSpPr>
           <p:nvPr/>
         </p:nvCxnSpPr>
         <p:spPr>
           <a:xfrm>
-            <a:off x="5757828" y="3557555"/>
-            <a:ext cx="664" cy="1515415"/>
+            <a:off x="4963400" y="1214999"/>
+            <a:ext cx="1996041" cy="623687"/>
           </a:xfrm>
-          <a:prstGeom prst="straightConnector1">
+          <a:prstGeom prst="bentConnector2">
             <a:avLst/>
           </a:prstGeom>
           <a:noFill/>
-          <a:ln w="28575" cap="flat" cmpd="sng" algn="ctr">
+          <a:ln w="25400" cap="flat" cmpd="sng" algn="ctr">
             <a:solidFill>
-              <a:srgbClr val="00B050"/>
+              <a:schemeClr val="tx1"/>
             </a:solidFill>
             <a:prstDash val="dash"/>
             <a:miter lim="800000"/>
@@ -6958,6 +6596,911 @@
           <a:effectLst/>
         </p:spPr>
       </p:cxnSp>
+      <p:cxnSp>
+        <p:nvCxnSpPr>
+          <p:cNvPr id="40" name="Straight Arrow Connector 39">
+            <a:extLst>
+              <a:ext uri="{FF2B5EF4-FFF2-40B4-BE49-F238E27FC236}">
+                <a16:creationId xmlns:a16="http://schemas.microsoft.com/office/drawing/2014/main" id="{5C96A930-84BC-3041-A1C2-0838C211D222}"/>
+              </a:ext>
+            </a:extLst>
+          </p:cNvPr>
+          <p:cNvCxnSpPr>
+            <a:cxnSpLocks/>
+            <a:stCxn id="76" idx="2"/>
+            <a:endCxn id="87" idx="2"/>
+          </p:cNvCxnSpPr>
+          <p:nvPr/>
+        </p:nvCxnSpPr>
+        <p:spPr>
+          <a:xfrm>
+            <a:off x="5034771" y="2582886"/>
+            <a:ext cx="524611" cy="629933"/>
+          </a:xfrm>
+          <a:prstGeom prst="straightConnector1">
+            <a:avLst/>
+          </a:prstGeom>
+          <a:ln w="25400">
+            <a:solidFill>
+              <a:schemeClr val="tx1"/>
+            </a:solidFill>
+            <a:prstDash val="dash"/>
+            <a:tailEnd type="triangle"/>
+          </a:ln>
+        </p:spPr>
+        <p:style>
+          <a:lnRef idx="1">
+            <a:schemeClr val="accent1"/>
+          </a:lnRef>
+          <a:fillRef idx="0">
+            <a:schemeClr val="accent1"/>
+          </a:fillRef>
+          <a:effectRef idx="0">
+            <a:schemeClr val="accent1"/>
+          </a:effectRef>
+          <a:fontRef idx="minor">
+            <a:schemeClr val="tx1"/>
+          </a:fontRef>
+        </p:style>
+      </p:cxnSp>
+      <p:sp>
+        <p:nvSpPr>
+          <p:cNvPr id="87" name="Oval 86">
+            <a:extLst>
+              <a:ext uri="{FF2B5EF4-FFF2-40B4-BE49-F238E27FC236}">
+                <a16:creationId xmlns:a16="http://schemas.microsoft.com/office/drawing/2014/main" id="{CA6C9072-E18D-5A47-B9D2-B883D90FF579}"/>
+              </a:ext>
+            </a:extLst>
+          </p:cNvPr>
+          <p:cNvSpPr>
+            <a:spLocks noChangeAspect="1"/>
+          </p:cNvSpPr>
+          <p:nvPr/>
+        </p:nvSpPr>
+        <p:spPr>
+          <a:xfrm>
+            <a:off x="5559382" y="3121379"/>
+            <a:ext cx="182880" cy="182880"/>
+          </a:xfrm>
+          <a:prstGeom prst="ellipse">
+            <a:avLst/>
+          </a:prstGeom>
+          <a:noFill/>
+          <a:ln w="25400">
+            <a:solidFill>
+              <a:schemeClr val="tx1"/>
+            </a:solidFill>
+          </a:ln>
+        </p:spPr>
+        <p:style>
+          <a:lnRef idx="2">
+            <a:schemeClr val="accent1">
+              <a:shade val="50000"/>
+            </a:schemeClr>
+          </a:lnRef>
+          <a:fillRef idx="1">
+            <a:schemeClr val="accent1"/>
+          </a:fillRef>
+          <a:effectRef idx="0">
+            <a:schemeClr val="accent1"/>
+          </a:effectRef>
+          <a:fontRef idx="minor">
+            <a:schemeClr val="lt1"/>
+          </a:fontRef>
+        </p:style>
+        <p:txBody>
+          <a:bodyPr rtlCol="0" anchor="ctr"/>
+          <a:lstStyle/>
+          <a:p>
+            <a:pPr algn="ctr"/>
+            <a:endParaRPr lang="en-US"/>
+          </a:p>
+        </p:txBody>
+      </p:sp>
+      <p:cxnSp>
+        <p:nvCxnSpPr>
+          <p:cNvPr id="106" name="Straight Arrow Connector 105">
+            <a:extLst>
+              <a:ext uri="{FF2B5EF4-FFF2-40B4-BE49-F238E27FC236}">
+                <a16:creationId xmlns:a16="http://schemas.microsoft.com/office/drawing/2014/main" id="{8C935D2A-E3B6-6944-9601-E9768D46D807}"/>
+              </a:ext>
+            </a:extLst>
+          </p:cNvPr>
+          <p:cNvCxnSpPr>
+            <a:cxnSpLocks/>
+            <a:stCxn id="77" idx="2"/>
+            <a:endCxn id="87" idx="0"/>
+          </p:cNvCxnSpPr>
+          <p:nvPr/>
+        </p:nvCxnSpPr>
+        <p:spPr>
+          <a:xfrm flipH="1">
+            <a:off x="5650822" y="2582886"/>
+            <a:ext cx="346284" cy="538493"/>
+          </a:xfrm>
+          <a:prstGeom prst="straightConnector1">
+            <a:avLst/>
+          </a:prstGeom>
+          <a:ln w="25400">
+            <a:solidFill>
+              <a:schemeClr val="tx1"/>
+            </a:solidFill>
+            <a:prstDash val="dash"/>
+            <a:tailEnd type="triangle"/>
+          </a:ln>
+        </p:spPr>
+        <p:style>
+          <a:lnRef idx="1">
+            <a:schemeClr val="accent1"/>
+          </a:lnRef>
+          <a:fillRef idx="0">
+            <a:schemeClr val="accent1"/>
+          </a:fillRef>
+          <a:effectRef idx="0">
+            <a:schemeClr val="accent1"/>
+          </a:effectRef>
+          <a:fontRef idx="minor">
+            <a:schemeClr val="tx1"/>
+          </a:fontRef>
+        </p:style>
+      </p:cxnSp>
+      <p:cxnSp>
+        <p:nvCxnSpPr>
+          <p:cNvPr id="109" name="Straight Arrow Connector 108">
+            <a:extLst>
+              <a:ext uri="{FF2B5EF4-FFF2-40B4-BE49-F238E27FC236}">
+                <a16:creationId xmlns:a16="http://schemas.microsoft.com/office/drawing/2014/main" id="{61B45BE4-D6DA-8F48-B61A-51C2C4E75204}"/>
+              </a:ext>
+            </a:extLst>
+          </p:cNvPr>
+          <p:cNvCxnSpPr>
+            <a:cxnSpLocks/>
+            <a:stCxn id="78" idx="2"/>
+            <a:endCxn id="87" idx="6"/>
+          </p:cNvCxnSpPr>
+          <p:nvPr/>
+        </p:nvCxnSpPr>
+        <p:spPr>
+          <a:xfrm flipH="1">
+            <a:off x="5742262" y="2582886"/>
+            <a:ext cx="1217179" cy="629933"/>
+          </a:xfrm>
+          <a:prstGeom prst="straightConnector1">
+            <a:avLst/>
+          </a:prstGeom>
+          <a:ln w="25400">
+            <a:solidFill>
+              <a:schemeClr val="tx1"/>
+            </a:solidFill>
+            <a:prstDash val="dash"/>
+            <a:tailEnd type="triangle"/>
+          </a:ln>
+        </p:spPr>
+        <p:style>
+          <a:lnRef idx="1">
+            <a:schemeClr val="accent1"/>
+          </a:lnRef>
+          <a:fillRef idx="0">
+            <a:schemeClr val="accent1"/>
+          </a:fillRef>
+          <a:effectRef idx="0">
+            <a:schemeClr val="accent1"/>
+          </a:effectRef>
+          <a:fontRef idx="minor">
+            <a:schemeClr val="tx1"/>
+          </a:fontRef>
+        </p:style>
+      </p:cxnSp>
+      <p:cxnSp>
+        <p:nvCxnSpPr>
+          <p:cNvPr id="115" name="Straight Arrow Connector 114">
+            <a:extLst>
+              <a:ext uri="{FF2B5EF4-FFF2-40B4-BE49-F238E27FC236}">
+                <a16:creationId xmlns:a16="http://schemas.microsoft.com/office/drawing/2014/main" id="{84B73658-5FF1-BE4D-A839-5F97D1CADEF1}"/>
+              </a:ext>
+            </a:extLst>
+          </p:cNvPr>
+          <p:cNvCxnSpPr>
+            <a:cxnSpLocks/>
+            <a:stCxn id="87" idx="4"/>
+          </p:cNvCxnSpPr>
+          <p:nvPr/>
+        </p:nvCxnSpPr>
+        <p:spPr>
+          <a:xfrm>
+            <a:off x="5650822" y="3304259"/>
+            <a:ext cx="6610" cy="1764801"/>
+          </a:xfrm>
+          <a:prstGeom prst="straightConnector1">
+            <a:avLst/>
+          </a:prstGeom>
+          <a:ln w="25400">
+            <a:solidFill>
+              <a:schemeClr val="tx1"/>
+            </a:solidFill>
+            <a:prstDash val="dash"/>
+            <a:tailEnd type="triangle"/>
+          </a:ln>
+        </p:spPr>
+        <p:style>
+          <a:lnRef idx="1">
+            <a:schemeClr val="accent1"/>
+          </a:lnRef>
+          <a:fillRef idx="0">
+            <a:schemeClr val="accent1"/>
+          </a:fillRef>
+          <a:effectRef idx="0">
+            <a:schemeClr val="accent1"/>
+          </a:effectRef>
+          <a:fontRef idx="minor">
+            <a:schemeClr val="tx1"/>
+          </a:fontRef>
+        </p:style>
+      </p:cxnSp>
+      <p:grpSp>
+        <p:nvGrpSpPr>
+          <p:cNvPr id="103" name="Group 102">
+            <a:extLst>
+              <a:ext uri="{FF2B5EF4-FFF2-40B4-BE49-F238E27FC236}">
+                <a16:creationId xmlns:a16="http://schemas.microsoft.com/office/drawing/2014/main" id="{F49108ED-E2EC-A04F-B805-797F8A2E518B}"/>
+              </a:ext>
+            </a:extLst>
+          </p:cNvPr>
+          <p:cNvGrpSpPr/>
+          <p:nvPr/>
+        </p:nvGrpSpPr>
+        <p:grpSpPr>
+          <a:xfrm>
+            <a:off x="91744" y="1609786"/>
+            <a:ext cx="1330005" cy="3865368"/>
+            <a:chOff x="74810" y="1956920"/>
+            <a:chExt cx="1330005" cy="3865368"/>
+          </a:xfrm>
+        </p:grpSpPr>
+        <p:sp>
+          <p:nvSpPr>
+            <p:cNvPr id="29" name="Oval 28">
+              <a:extLst>
+                <a:ext uri="{FF2B5EF4-FFF2-40B4-BE49-F238E27FC236}">
+                  <a16:creationId xmlns:a16="http://schemas.microsoft.com/office/drawing/2014/main" id="{F56FB104-9D0D-D245-80A2-BC882529750C}"/>
+                </a:ext>
+              </a:extLst>
+            </p:cNvPr>
+            <p:cNvSpPr/>
+            <p:nvPr/>
+          </p:nvSpPr>
+          <p:spPr>
+            <a:xfrm>
+              <a:off x="104304" y="2338956"/>
+              <a:ext cx="1271016" cy="462009"/>
+            </a:xfrm>
+            <a:prstGeom prst="ellipse">
+              <a:avLst/>
+            </a:prstGeom>
+            <a:solidFill>
+              <a:srgbClr val="307F9C"/>
+            </a:solidFill>
+            <a:ln w="12700" cap="flat" cmpd="sng" algn="ctr">
+              <a:noFill/>
+              <a:prstDash val="solid"/>
+              <a:miter lim="800000"/>
+            </a:ln>
+            <a:effectLst/>
+          </p:spPr>
+          <p:txBody>
+            <a:bodyPr rtlCol="0" anchor="ctr"/>
+            <a:lstStyle/>
+            <a:p>
+              <a:pPr marL="0" marR="0" lvl="0" indent="0" algn="ctr" defTabSz="914400" eaLnBrk="1" fontAlgn="auto" latinLnBrk="0" hangingPunct="1">
+                <a:lnSpc>
+                  <a:spcPct val="100000"/>
+                </a:lnSpc>
+                <a:spcBef>
+                  <a:spcPts val="0"/>
+                </a:spcBef>
+                <a:spcAft>
+                  <a:spcPts val="0"/>
+                </a:spcAft>
+                <a:buClr>
+                  <a:srgbClr val="000000"/>
+                </a:buClr>
+                <a:buSzTx/>
+                <a:buFont typeface="Arial"/>
+                <a:buNone/>
+                <a:tabLst/>
+                <a:defRPr/>
+              </a:pPr>
+              <a:r>
+                <a:rPr kumimoji="0" lang="en-US" sz="1200" b="0" i="0" u="none" strike="noStrike" kern="0" cap="none" spc="0" normalizeH="0" baseline="0" noProof="0" dirty="0">
+                  <a:ln>
+                    <a:noFill/>
+                  </a:ln>
+                  <a:solidFill>
+                    <a:srgbClr val="FFFFFF"/>
+                  </a:solidFill>
+                  <a:effectLst/>
+                  <a:uLnTx/>
+                  <a:uFillTx/>
+                  <a:latin typeface="Calibri" panose="020F0502020204030204"/>
+                  <a:ea typeface="+mn-ea"/>
+                  <a:cs typeface="+mn-cs"/>
+                  <a:sym typeface="Arial"/>
+                </a:rPr>
+                <a:t>Exogenous Scenario</a:t>
+              </a:r>
+            </a:p>
+          </p:txBody>
+        </p:sp>
+        <p:sp>
+          <p:nvSpPr>
+            <p:cNvPr id="31" name="Rounded Rectangle 30">
+              <a:extLst>
+                <a:ext uri="{FF2B5EF4-FFF2-40B4-BE49-F238E27FC236}">
+                  <a16:creationId xmlns:a16="http://schemas.microsoft.com/office/drawing/2014/main" id="{64DE08EC-9A73-5D41-A228-A2A023250EB5}"/>
+                </a:ext>
+              </a:extLst>
+            </p:cNvPr>
+            <p:cNvSpPr/>
+            <p:nvPr/>
+          </p:nvSpPr>
+          <p:spPr>
+            <a:xfrm>
+              <a:off x="145452" y="2930706"/>
+              <a:ext cx="1188720" cy="802758"/>
+            </a:xfrm>
+            <a:prstGeom prst="roundRect">
+              <a:avLst/>
+            </a:prstGeom>
+            <a:solidFill>
+              <a:schemeClr val="bg1">
+                <a:lumMod val="50000"/>
+              </a:schemeClr>
+            </a:solidFill>
+            <a:ln w="25400" cap="flat" cmpd="sng" algn="ctr">
+              <a:solidFill>
+                <a:schemeClr val="tx1"/>
+              </a:solidFill>
+              <a:prstDash val="solid"/>
+              <a:miter lim="800000"/>
+            </a:ln>
+            <a:effectLst/>
+          </p:spPr>
+          <p:txBody>
+            <a:bodyPr rtlCol="0" anchor="ctr"/>
+            <a:lstStyle/>
+            <a:p>
+              <a:pPr marL="0" marR="0" lvl="0" indent="0" algn="ctr" defTabSz="914400" eaLnBrk="1" fontAlgn="auto" latinLnBrk="0" hangingPunct="1">
+                <a:lnSpc>
+                  <a:spcPct val="100000"/>
+                </a:lnSpc>
+                <a:spcBef>
+                  <a:spcPts val="0"/>
+                </a:spcBef>
+                <a:spcAft>
+                  <a:spcPts val="0"/>
+                </a:spcAft>
+                <a:buClr>
+                  <a:srgbClr val="000000"/>
+                </a:buClr>
+                <a:buSzTx/>
+                <a:buFont typeface="Arial"/>
+                <a:buNone/>
+                <a:tabLst/>
+                <a:defRPr/>
+              </a:pPr>
+              <a:r>
+                <a:rPr kumimoji="0" lang="en-US" sz="1400" b="0" i="0" u="none" strike="noStrike" kern="0" cap="none" spc="0" normalizeH="0" baseline="0" noProof="0" dirty="0">
+                  <a:ln>
+                    <a:noFill/>
+                  </a:ln>
+                  <a:solidFill>
+                    <a:srgbClr val="FFFFFF"/>
+                  </a:solidFill>
+                  <a:effectLst/>
+                  <a:uLnTx/>
+                  <a:uFillTx/>
+                  <a:latin typeface="Calibri" panose="020F0502020204030204"/>
+                  <a:ea typeface="+mn-ea"/>
+                  <a:cs typeface="+mn-cs"/>
+                  <a:sym typeface="Arial"/>
+                </a:rPr>
+                <a:t>Model</a:t>
+              </a:r>
+            </a:p>
+          </p:txBody>
+        </p:sp>
+        <p:sp>
+          <p:nvSpPr>
+            <p:cNvPr id="35" name="TextBox 34">
+              <a:extLst>
+                <a:ext uri="{FF2B5EF4-FFF2-40B4-BE49-F238E27FC236}">
+                  <a16:creationId xmlns:a16="http://schemas.microsoft.com/office/drawing/2014/main" id="{E18794E3-E5B7-084B-B1CC-6DE7E21ED13B}"/>
+                </a:ext>
+              </a:extLst>
+            </p:cNvPr>
+            <p:cNvSpPr txBox="1"/>
+            <p:nvPr/>
+          </p:nvSpPr>
+          <p:spPr>
+            <a:xfrm>
+              <a:off x="330085" y="1956920"/>
+              <a:ext cx="819455" cy="307777"/>
+            </a:xfrm>
+            <a:prstGeom prst="rect">
+              <a:avLst/>
+            </a:prstGeom>
+            <a:noFill/>
+          </p:spPr>
+          <p:txBody>
+            <a:bodyPr wrap="none" rtlCol="0">
+              <a:spAutoFit/>
+            </a:bodyPr>
+            <a:lstStyle/>
+            <a:p>
+              <a:pPr>
+                <a:buClr>
+                  <a:srgbClr val="000000"/>
+                </a:buClr>
+                <a:buFont typeface="Arial"/>
+                <a:buNone/>
+              </a:pPr>
+              <a:r>
+                <a:rPr lang="en-US" sz="1400" b="1" kern="0" dirty="0">
+                  <a:solidFill>
+                    <a:srgbClr val="000000"/>
+                  </a:solidFill>
+                  <a:latin typeface="Arial"/>
+                  <a:cs typeface="Arial"/>
+                  <a:sym typeface="Arial"/>
+                </a:rPr>
+                <a:t>Legend</a:t>
+              </a:r>
+            </a:p>
+          </p:txBody>
+        </p:sp>
+        <p:grpSp>
+          <p:nvGrpSpPr>
+            <p:cNvPr id="7" name="Group 6">
+              <a:extLst>
+                <a:ext uri="{FF2B5EF4-FFF2-40B4-BE49-F238E27FC236}">
+                  <a16:creationId xmlns:a16="http://schemas.microsoft.com/office/drawing/2014/main" id="{B6A06564-2248-3A4A-B71D-C12038F41874}"/>
+                </a:ext>
+              </a:extLst>
+            </p:cNvPr>
+            <p:cNvGrpSpPr/>
+            <p:nvPr/>
+          </p:nvGrpSpPr>
+          <p:grpSpPr>
+            <a:xfrm>
+              <a:off x="269171" y="3772123"/>
+              <a:ext cx="941283" cy="353538"/>
+              <a:chOff x="229039" y="3772123"/>
+              <a:chExt cx="941283" cy="353538"/>
+            </a:xfrm>
+          </p:grpSpPr>
+          <p:sp>
+            <p:nvSpPr>
+              <p:cNvPr id="203" name="TextBox 202">
+                <a:extLst>
+                  <a:ext uri="{FF2B5EF4-FFF2-40B4-BE49-F238E27FC236}">
+                    <a16:creationId xmlns:a16="http://schemas.microsoft.com/office/drawing/2014/main" id="{777C1B20-7A8B-3B43-9896-A5BEAC01CBA9}"/>
+                  </a:ext>
+                </a:extLst>
+              </p:cNvPr>
+              <p:cNvSpPr txBox="1"/>
+              <p:nvPr/>
+            </p:nvSpPr>
+            <p:spPr>
+              <a:xfrm>
+                <a:off x="229039" y="3772123"/>
+                <a:ext cx="941283" cy="307777"/>
+              </a:xfrm>
+              <a:prstGeom prst="rect">
+                <a:avLst/>
+              </a:prstGeom>
+              <a:noFill/>
+            </p:spPr>
+            <p:txBody>
+              <a:bodyPr wrap="none" rtlCol="0">
+                <a:spAutoFit/>
+              </a:bodyPr>
+              <a:lstStyle/>
+              <a:p>
+                <a:pPr algn="ctr">
+                  <a:buClr>
+                    <a:srgbClr val="000000"/>
+                  </a:buClr>
+                  <a:buFont typeface="Arial"/>
+                  <a:buNone/>
+                </a:pPr>
+                <a:r>
+                  <a:rPr lang="en-US" sz="1400" kern="0" dirty="0">
+                    <a:solidFill>
+                      <a:schemeClr val="bg1">
+                        <a:lumMod val="50000"/>
+                      </a:schemeClr>
+                    </a:solidFill>
+                    <a:latin typeface="Arial"/>
+                    <a:cs typeface="Arial"/>
+                    <a:sym typeface="Arial"/>
+                  </a:rPr>
+                  <a:t>Coupling </a:t>
+                </a:r>
+              </a:p>
+            </p:txBody>
+          </p:sp>
+          <p:cxnSp>
+            <p:nvCxnSpPr>
+              <p:cNvPr id="204" name="Straight Arrow Connector 203">
+                <a:extLst>
+                  <a:ext uri="{FF2B5EF4-FFF2-40B4-BE49-F238E27FC236}">
+                    <a16:creationId xmlns:a16="http://schemas.microsoft.com/office/drawing/2014/main" id="{6CCA6508-87D9-8B4D-930D-E1A1CDDB9EDE}"/>
+                  </a:ext>
+                </a:extLst>
+              </p:cNvPr>
+              <p:cNvCxnSpPr>
+                <a:cxnSpLocks/>
+              </p:cNvCxnSpPr>
+              <p:nvPr/>
+            </p:nvCxnSpPr>
+            <p:spPr>
+              <a:xfrm>
+                <a:off x="282808" y="4125661"/>
+                <a:ext cx="833745" cy="0"/>
+              </a:xfrm>
+              <a:prstGeom prst="straightConnector1">
+                <a:avLst/>
+              </a:prstGeom>
+              <a:noFill/>
+              <a:ln w="28575" cap="flat" cmpd="sng" algn="ctr">
+                <a:solidFill>
+                  <a:schemeClr val="bg1">
+                    <a:lumMod val="50000"/>
+                  </a:schemeClr>
+                </a:solidFill>
+                <a:prstDash val="solid"/>
+                <a:miter lim="800000"/>
+                <a:tailEnd type="triangle" w="lg" len="lg"/>
+              </a:ln>
+              <a:effectLst/>
+            </p:spPr>
+          </p:cxnSp>
+        </p:grpSp>
+        <p:grpSp>
+          <p:nvGrpSpPr>
+            <p:cNvPr id="11" name="Group 10">
+              <a:extLst>
+                <a:ext uri="{FF2B5EF4-FFF2-40B4-BE49-F238E27FC236}">
+                  <a16:creationId xmlns:a16="http://schemas.microsoft.com/office/drawing/2014/main" id="{9C52BBD8-1A23-014D-A601-48DA43FB3C4C}"/>
+                </a:ext>
+              </a:extLst>
+            </p:cNvPr>
+            <p:cNvGrpSpPr/>
+            <p:nvPr/>
+          </p:nvGrpSpPr>
+          <p:grpSpPr>
+            <a:xfrm>
+              <a:off x="74810" y="4278616"/>
+              <a:ext cx="1330005" cy="633564"/>
+              <a:chOff x="293992" y="6102043"/>
+              <a:chExt cx="1330005" cy="633564"/>
+            </a:xfrm>
+          </p:grpSpPr>
+          <p:cxnSp>
+            <p:nvCxnSpPr>
+              <p:cNvPr id="71" name="Straight Arrow Connector 70">
+                <a:extLst>
+                  <a:ext uri="{FF2B5EF4-FFF2-40B4-BE49-F238E27FC236}">
+                    <a16:creationId xmlns:a16="http://schemas.microsoft.com/office/drawing/2014/main" id="{3848818D-6426-6941-B7C5-B1B59CFCBC19}"/>
+                  </a:ext>
+                </a:extLst>
+              </p:cNvPr>
+              <p:cNvCxnSpPr>
+                <a:cxnSpLocks/>
+              </p:cNvCxnSpPr>
+              <p:nvPr/>
+            </p:nvCxnSpPr>
+            <p:spPr>
+              <a:xfrm>
+                <a:off x="293992" y="6225153"/>
+                <a:ext cx="548640" cy="0"/>
+              </a:xfrm>
+              <a:prstGeom prst="straightConnector1">
+                <a:avLst/>
+              </a:prstGeom>
+              <a:noFill/>
+              <a:ln w="28575" cap="flat" cmpd="sng" algn="ctr">
+                <a:solidFill>
+                  <a:schemeClr val="tx1"/>
+                </a:solidFill>
+                <a:prstDash val="solid"/>
+                <a:miter lim="800000"/>
+                <a:tailEnd type="triangle" w="lg" len="lg"/>
+              </a:ln>
+              <a:effectLst/>
+            </p:spPr>
+          </p:cxnSp>
+          <p:sp>
+            <p:nvSpPr>
+              <p:cNvPr id="6" name="TextBox 5">
+                <a:extLst>
+                  <a:ext uri="{FF2B5EF4-FFF2-40B4-BE49-F238E27FC236}">
+                    <a16:creationId xmlns:a16="http://schemas.microsoft.com/office/drawing/2014/main" id="{741A565B-90ED-B648-8687-E708FBAEAEAC}"/>
+                  </a:ext>
+                </a:extLst>
+              </p:cNvPr>
+              <p:cNvSpPr txBox="1"/>
+              <p:nvPr/>
+            </p:nvSpPr>
+            <p:spPr>
+              <a:xfrm>
+                <a:off x="805562" y="6102043"/>
+                <a:ext cx="818435" cy="246221"/>
+              </a:xfrm>
+              <a:prstGeom prst="rect">
+                <a:avLst/>
+              </a:prstGeom>
+              <a:noFill/>
+            </p:spPr>
+            <p:txBody>
+              <a:bodyPr wrap="square" rtlCol="0">
+                <a:spAutoFit/>
+              </a:bodyPr>
+              <a:lstStyle/>
+              <a:p>
+                <a:r>
+                  <a:rPr lang="en-US" sz="1000" dirty="0">
+                    <a:latin typeface="Arial" panose="020B0604020202020204" pitchFamily="34" charset="0"/>
+                    <a:cs typeface="Arial" panose="020B0604020202020204" pitchFamily="34" charset="0"/>
+                  </a:rPr>
+                  <a:t>Completed</a:t>
+                </a:r>
+              </a:p>
+            </p:txBody>
+          </p:sp>
+          <p:cxnSp>
+            <p:nvCxnSpPr>
+              <p:cNvPr id="72" name="Straight Arrow Connector 71">
+                <a:extLst>
+                  <a:ext uri="{FF2B5EF4-FFF2-40B4-BE49-F238E27FC236}">
+                    <a16:creationId xmlns:a16="http://schemas.microsoft.com/office/drawing/2014/main" id="{7B7C24A9-5999-2F4E-B4ED-06F39EE1C0FC}"/>
+                  </a:ext>
+                </a:extLst>
+              </p:cNvPr>
+              <p:cNvCxnSpPr>
+                <a:cxnSpLocks/>
+              </p:cNvCxnSpPr>
+              <p:nvPr/>
+            </p:nvCxnSpPr>
+            <p:spPr>
+              <a:xfrm>
+                <a:off x="293992" y="6417151"/>
+                <a:ext cx="548640" cy="0"/>
+              </a:xfrm>
+              <a:prstGeom prst="straightConnector1">
+                <a:avLst/>
+              </a:prstGeom>
+              <a:noFill/>
+              <a:ln w="28575" cap="flat" cmpd="sng" algn="ctr">
+                <a:solidFill>
+                  <a:schemeClr val="tx1"/>
+                </a:solidFill>
+                <a:prstDash val="dash"/>
+                <a:miter lim="800000"/>
+                <a:tailEnd type="triangle" w="lg" len="lg"/>
+              </a:ln>
+              <a:effectLst/>
+            </p:spPr>
+          </p:cxnSp>
+          <p:sp>
+            <p:nvSpPr>
+              <p:cNvPr id="74" name="TextBox 73">
+                <a:extLst>
+                  <a:ext uri="{FF2B5EF4-FFF2-40B4-BE49-F238E27FC236}">
+                    <a16:creationId xmlns:a16="http://schemas.microsoft.com/office/drawing/2014/main" id="{22B61D55-0E71-D649-AAEA-6AE9B632C137}"/>
+                  </a:ext>
+                </a:extLst>
+              </p:cNvPr>
+              <p:cNvSpPr txBox="1"/>
+              <p:nvPr/>
+            </p:nvSpPr>
+            <p:spPr>
+              <a:xfrm>
+                <a:off x="805563" y="6294041"/>
+                <a:ext cx="741412" cy="246221"/>
+              </a:xfrm>
+              <a:prstGeom prst="rect">
+                <a:avLst/>
+              </a:prstGeom>
+              <a:noFill/>
+            </p:spPr>
+            <p:txBody>
+              <a:bodyPr wrap="square" rtlCol="0">
+                <a:spAutoFit/>
+              </a:bodyPr>
+              <a:lstStyle/>
+              <a:p>
+                <a:r>
+                  <a:rPr lang="en-US" sz="1000" dirty="0">
+                    <a:latin typeface="Arial" panose="020B0604020202020204" pitchFamily="34" charset="0"/>
+                    <a:cs typeface="Arial" panose="020B0604020202020204" pitchFamily="34" charset="0"/>
+                  </a:rPr>
+                  <a:t>Tested</a:t>
+                </a:r>
+              </a:p>
+            </p:txBody>
+          </p:sp>
+          <p:cxnSp>
+            <p:nvCxnSpPr>
+              <p:cNvPr id="73" name="Straight Arrow Connector 72">
+                <a:extLst>
+                  <a:ext uri="{FF2B5EF4-FFF2-40B4-BE49-F238E27FC236}">
+                    <a16:creationId xmlns:a16="http://schemas.microsoft.com/office/drawing/2014/main" id="{304CB50A-1E82-A941-B734-3708FEBA8BBA}"/>
+                  </a:ext>
+                </a:extLst>
+              </p:cNvPr>
+              <p:cNvCxnSpPr>
+                <a:cxnSpLocks/>
+              </p:cNvCxnSpPr>
+              <p:nvPr/>
+            </p:nvCxnSpPr>
+            <p:spPr>
+              <a:xfrm>
+                <a:off x="293992" y="6612496"/>
+                <a:ext cx="548640" cy="0"/>
+              </a:xfrm>
+              <a:prstGeom prst="straightConnector1">
+                <a:avLst/>
+              </a:prstGeom>
+              <a:noFill/>
+              <a:ln w="28575" cap="flat" cmpd="sng" algn="ctr">
+                <a:solidFill>
+                  <a:schemeClr val="tx1"/>
+                </a:solidFill>
+                <a:prstDash val="sysDot"/>
+                <a:miter lim="800000"/>
+                <a:tailEnd type="triangle" w="lg" len="lg"/>
+              </a:ln>
+              <a:effectLst/>
+            </p:spPr>
+          </p:cxnSp>
+          <p:sp>
+            <p:nvSpPr>
+              <p:cNvPr id="75" name="TextBox 74">
+                <a:extLst>
+                  <a:ext uri="{FF2B5EF4-FFF2-40B4-BE49-F238E27FC236}">
+                    <a16:creationId xmlns:a16="http://schemas.microsoft.com/office/drawing/2014/main" id="{61F1AFC1-666C-284A-94A7-8CDC2A4EFA17}"/>
+                  </a:ext>
+                </a:extLst>
+              </p:cNvPr>
+              <p:cNvSpPr txBox="1"/>
+              <p:nvPr/>
+            </p:nvSpPr>
+            <p:spPr>
+              <a:xfrm>
+                <a:off x="805563" y="6489386"/>
+                <a:ext cx="741412" cy="246221"/>
+              </a:xfrm>
+              <a:prstGeom prst="rect">
+                <a:avLst/>
+              </a:prstGeom>
+              <a:noFill/>
+            </p:spPr>
+            <p:txBody>
+              <a:bodyPr wrap="square" rtlCol="0">
+                <a:spAutoFit/>
+              </a:bodyPr>
+              <a:lstStyle/>
+              <a:p>
+                <a:r>
+                  <a:rPr lang="en-US" sz="1000" dirty="0">
+                    <a:latin typeface="Arial" panose="020B0604020202020204" pitchFamily="34" charset="0"/>
+                    <a:cs typeface="Arial" panose="020B0604020202020204" pitchFamily="34" charset="0"/>
+                  </a:rPr>
+                  <a:t>Planned</a:t>
+                </a:r>
+              </a:p>
+            </p:txBody>
+          </p:sp>
+        </p:grpSp>
+        <p:sp>
+          <p:nvSpPr>
+            <p:cNvPr id="13" name="TextBox 12">
+              <a:extLst>
+                <a:ext uri="{FF2B5EF4-FFF2-40B4-BE49-F238E27FC236}">
+                  <a16:creationId xmlns:a16="http://schemas.microsoft.com/office/drawing/2014/main" id="{8F2808AF-5952-8843-AF70-52BA5B85ABA7}"/>
+                </a:ext>
+              </a:extLst>
+            </p:cNvPr>
+            <p:cNvSpPr txBox="1"/>
+            <p:nvPr/>
+          </p:nvSpPr>
+          <p:spPr>
+            <a:xfrm>
+              <a:off x="129156" y="4976401"/>
+              <a:ext cx="1221313" cy="523220"/>
+            </a:xfrm>
+            <a:prstGeom prst="rect">
+              <a:avLst/>
+            </a:prstGeom>
+            <a:noFill/>
+          </p:spPr>
+          <p:txBody>
+            <a:bodyPr wrap="square" rtlCol="0">
+              <a:spAutoFit/>
+            </a:bodyPr>
+            <a:lstStyle/>
+            <a:p>
+              <a:pPr algn="ctr"/>
+              <a:r>
+                <a:rPr lang="en-US" sz="1400" b="1" dirty="0">
+                  <a:solidFill>
+                    <a:srgbClr val="7030A0"/>
+                  </a:solidFill>
+                  <a:latin typeface="Arial" panose="020B0604020202020204" pitchFamily="34" charset="0"/>
+                  <a:cs typeface="Arial" panose="020B0604020202020204" pitchFamily="34" charset="0"/>
+                </a:rPr>
+                <a:t>Scale</a:t>
+              </a:r>
+            </a:p>
+            <a:p>
+              <a:pPr algn="ctr"/>
+              <a:r>
+                <a:rPr lang="en-US" sz="1400" b="1" dirty="0">
+                  <a:solidFill>
+                    <a:srgbClr val="7030A0"/>
+                  </a:solidFill>
+                  <a:latin typeface="Arial" panose="020B0604020202020204" pitchFamily="34" charset="0"/>
+                  <a:cs typeface="Arial" panose="020B0604020202020204" pitchFamily="34" charset="0"/>
+                </a:rPr>
+                <a:t>(Resolution)</a:t>
+              </a:r>
+            </a:p>
+          </p:txBody>
+        </p:sp>
+        <p:sp>
+          <p:nvSpPr>
+            <p:cNvPr id="118" name="TextBox 117">
+              <a:extLst>
+                <a:ext uri="{FF2B5EF4-FFF2-40B4-BE49-F238E27FC236}">
+                  <a16:creationId xmlns:a16="http://schemas.microsoft.com/office/drawing/2014/main" id="{137691AA-0AEF-B34E-991D-DFE44F2A79A5}"/>
+                </a:ext>
+              </a:extLst>
+            </p:cNvPr>
+            <p:cNvSpPr txBox="1"/>
+            <p:nvPr/>
+          </p:nvSpPr>
+          <p:spPr>
+            <a:xfrm>
+              <a:off x="129156" y="5514511"/>
+              <a:ext cx="1221313" cy="307777"/>
+            </a:xfrm>
+            <a:prstGeom prst="rect">
+              <a:avLst/>
+            </a:prstGeom>
+            <a:noFill/>
+          </p:spPr>
+          <p:txBody>
+            <a:bodyPr wrap="square" rtlCol="0">
+              <a:spAutoFit/>
+            </a:bodyPr>
+            <a:lstStyle/>
+            <a:p>
+              <a:pPr algn="ctr"/>
+              <a:r>
+                <a:rPr lang="en-US" sz="1400" b="1" dirty="0">
+                  <a:solidFill>
+                    <a:schemeClr val="accent2"/>
+                  </a:solidFill>
+                  <a:latin typeface="Arial" panose="020B0604020202020204" pitchFamily="34" charset="0"/>
+                  <a:cs typeface="Arial" panose="020B0604020202020204" pitchFamily="34" charset="0"/>
+                </a:rPr>
+                <a:t>Variable</a:t>
+              </a:r>
+            </a:p>
+          </p:txBody>
+        </p:sp>
+      </p:grpSp>
     </p:spTree>
     <p:extLst>
       <p:ext uri="{BB962C8B-B14F-4D97-AF65-F5344CB8AC3E}">

</xml_diff>